<commit_message>
updated on paper notes.
</commit_message>
<xml_diff>
--- a/Documentation/MsSqlRecoveryTester.Concepts.pptx
+++ b/Documentation/MsSqlRecoveryTester.Concepts.pptx
@@ -4,6 +4,9 @@
   <p:sldMasterIdLst>
     <p:sldMasterId id="2147483648" r:id="rId1"/>
   </p:sldMasterIdLst>
+  <p:notesMasterIdLst>
+    <p:notesMasterId r:id="rId11"/>
+  </p:notesMasterIdLst>
   <p:sldIdLst>
     <p:sldId id="256" r:id="rId2"/>
     <p:sldId id="257" r:id="rId3"/>
@@ -1159,7 +1162,7 @@
         <a:p>
           <a:r>
             <a:rPr lang="en-US" dirty="0"/>
-            <a:t>Configuration</a:t>
+            <a:t>Configuration (Features)</a:t>
           </a:r>
         </a:p>
       </dgm:t>
@@ -1586,6 +1589,114 @@
         </a:p>
       </dgm:t>
     </dgm:pt>
+    <dgm:pt modelId="{0691445B-1196-4650-BA5A-7CD5A3350553}">
+      <dgm:prSet phldrT="[Text]"/>
+      <dgm:spPr/>
+      <dgm:t>
+        <a:bodyPr/>
+        <a:lstStyle/>
+        <a:p>
+          <a:r>
+            <a:rPr lang="en-US" dirty="0"/>
+            <a:t>Cleanup</a:t>
+          </a:r>
+        </a:p>
+      </dgm:t>
+    </dgm:pt>
+    <dgm:pt modelId="{5DA4DA25-D2F8-41BF-B536-2C40DBB746D7}" type="parTrans" cxnId="{8C8E1FA7-BE27-4E3B-9F86-6B0A4C507166}">
+      <dgm:prSet/>
+      <dgm:spPr/>
+      <dgm:t>
+        <a:bodyPr/>
+        <a:lstStyle/>
+        <a:p>
+          <a:endParaRPr lang="da-DK"/>
+        </a:p>
+      </dgm:t>
+    </dgm:pt>
+    <dgm:pt modelId="{03B9520E-EF56-420A-B5DF-52B5D9F7A6A5}" type="sibTrans" cxnId="{8C8E1FA7-BE27-4E3B-9F86-6B0A4C507166}">
+      <dgm:prSet/>
+      <dgm:spPr/>
+      <dgm:t>
+        <a:bodyPr/>
+        <a:lstStyle/>
+        <a:p>
+          <a:endParaRPr lang="da-DK"/>
+        </a:p>
+      </dgm:t>
+    </dgm:pt>
+    <dgm:pt modelId="{1059B3D3-915E-4391-8D5F-E03C7752CAFB}">
+      <dgm:prSet phldrT="[Text]"/>
+      <dgm:spPr/>
+      <dgm:t>
+        <a:bodyPr/>
+        <a:lstStyle/>
+        <a:p>
+          <a:r>
+            <a:rPr lang="en-US" dirty="0"/>
+            <a:t>Database</a:t>
+          </a:r>
+        </a:p>
+      </dgm:t>
+    </dgm:pt>
+    <dgm:pt modelId="{9701CBAF-58C8-48AB-B129-AE53B786ECF3}" type="parTrans" cxnId="{7615E644-DBA7-4E1B-9D08-8FCF11FF8A80}">
+      <dgm:prSet/>
+      <dgm:spPr/>
+      <dgm:t>
+        <a:bodyPr/>
+        <a:lstStyle/>
+        <a:p>
+          <a:endParaRPr lang="da-DK"/>
+        </a:p>
+      </dgm:t>
+    </dgm:pt>
+    <dgm:pt modelId="{D16BBFAF-D28E-499C-AA88-A087268EDD84}" type="sibTrans" cxnId="{7615E644-DBA7-4E1B-9D08-8FCF11FF8A80}">
+      <dgm:prSet/>
+      <dgm:spPr/>
+      <dgm:t>
+        <a:bodyPr/>
+        <a:lstStyle/>
+        <a:p>
+          <a:endParaRPr lang="da-DK"/>
+        </a:p>
+      </dgm:t>
+    </dgm:pt>
+    <dgm:pt modelId="{5E3574A7-A551-4BE6-B3D6-61FD3F1C0B90}">
+      <dgm:prSet phldrT="[Text]"/>
+      <dgm:spPr/>
+      <dgm:t>
+        <a:bodyPr/>
+        <a:lstStyle/>
+        <a:p>
+          <a:r>
+            <a:rPr lang="en-US" dirty="0"/>
+            <a:t>Backup set</a:t>
+          </a:r>
+        </a:p>
+      </dgm:t>
+    </dgm:pt>
+    <dgm:pt modelId="{F662931B-9EC7-404B-AC8A-569B077EF776}" type="parTrans" cxnId="{0375C84A-24CD-415A-93AA-27935D1E4C1D}">
+      <dgm:prSet/>
+      <dgm:spPr/>
+      <dgm:t>
+        <a:bodyPr/>
+        <a:lstStyle/>
+        <a:p>
+          <a:endParaRPr lang="da-DK"/>
+        </a:p>
+      </dgm:t>
+    </dgm:pt>
+    <dgm:pt modelId="{734AEECF-7235-421F-A044-87B64C62A4C5}" type="sibTrans" cxnId="{0375C84A-24CD-415A-93AA-27935D1E4C1D}">
+      <dgm:prSet/>
+      <dgm:spPr/>
+      <dgm:t>
+        <a:bodyPr/>
+        <a:lstStyle/>
+        <a:p>
+          <a:endParaRPr lang="da-DK"/>
+        </a:p>
+      </dgm:t>
+    </dgm:pt>
     <dgm:pt modelId="{486D9A37-AB3F-4BD7-A508-0857317AB0AB}" type="pres">
       <dgm:prSet presAssocID="{05A2A666-C2AA-44F5-AE5E-B6D075A8A01C}" presName="Name0" presStyleCnt="0">
         <dgm:presLayoutVars>
@@ -1600,7 +1711,7 @@
       <dgm:spPr/>
     </dgm:pt>
     <dgm:pt modelId="{0EE031CF-09EC-4211-B419-9A75B30AA316}" type="pres">
-      <dgm:prSet presAssocID="{F4790FF3-1826-421D-BEB6-E5A90514D83B}" presName="imagSh" presStyleLbl="bgImgPlace1" presStyleIdx="0" presStyleCnt="7"/>
+      <dgm:prSet presAssocID="{F4790FF3-1826-421D-BEB6-E5A90514D83B}" presName="imagSh" presStyleLbl="bgImgPlace1" presStyleIdx="0" presStyleCnt="8"/>
       <dgm:spPr>
         <a:blipFill>
           <a:blip xmlns:r="http://schemas.openxmlformats.org/officeDocument/2006/relationships" r:embed="rId1" cstate="print">
@@ -1621,7 +1732,7 @@
       </dgm:spPr>
     </dgm:pt>
     <dgm:pt modelId="{96B4A9A9-9508-4DDC-BDDD-6C847151EA0D}" type="pres">
-      <dgm:prSet presAssocID="{F4790FF3-1826-421D-BEB6-E5A90514D83B}" presName="txNode" presStyleLbl="node1" presStyleIdx="0" presStyleCnt="7">
+      <dgm:prSet presAssocID="{F4790FF3-1826-421D-BEB6-E5A90514D83B}" presName="txNode" presStyleLbl="node1" presStyleIdx="0" presStyleCnt="8">
         <dgm:presLayoutVars>
           <dgm:bulletEnabled val="1"/>
         </dgm:presLayoutVars>
@@ -1629,11 +1740,11 @@
       <dgm:spPr/>
     </dgm:pt>
     <dgm:pt modelId="{3BFE17F0-16D8-410B-9E73-9189BA87476A}" type="pres">
-      <dgm:prSet presAssocID="{C95D1DD7-0EDC-46B7-8BF5-4F95326559DE}" presName="sibTrans" presStyleLbl="sibTrans2D1" presStyleIdx="0" presStyleCnt="6"/>
+      <dgm:prSet presAssocID="{C95D1DD7-0EDC-46B7-8BF5-4F95326559DE}" presName="sibTrans" presStyleLbl="sibTrans2D1" presStyleIdx="0" presStyleCnt="7"/>
       <dgm:spPr/>
     </dgm:pt>
     <dgm:pt modelId="{9BB52CFD-5C58-411C-B16F-247FCA4BC3EF}" type="pres">
-      <dgm:prSet presAssocID="{C95D1DD7-0EDC-46B7-8BF5-4F95326559DE}" presName="connTx" presStyleLbl="sibTrans2D1" presStyleIdx="0" presStyleCnt="6"/>
+      <dgm:prSet presAssocID="{C95D1DD7-0EDC-46B7-8BF5-4F95326559DE}" presName="connTx" presStyleLbl="sibTrans2D1" presStyleIdx="0" presStyleCnt="7"/>
       <dgm:spPr/>
     </dgm:pt>
     <dgm:pt modelId="{02B9C748-C81A-45ED-99B8-DF816E44FBB5}" type="pres">
@@ -1641,7 +1752,7 @@
       <dgm:spPr/>
     </dgm:pt>
     <dgm:pt modelId="{C7F830C1-9D38-49F4-81F8-C1A18AECBC64}" type="pres">
-      <dgm:prSet presAssocID="{C034EC04-B203-443F-A9D8-F90ED877BF90}" presName="imagSh" presStyleLbl="bgImgPlace1" presStyleIdx="1" presStyleCnt="7"/>
+      <dgm:prSet presAssocID="{C034EC04-B203-443F-A9D8-F90ED877BF90}" presName="imagSh" presStyleLbl="bgImgPlace1" presStyleIdx="1" presStyleCnt="8"/>
       <dgm:spPr>
         <a:blipFill>
           <a:blip xmlns:r="http://schemas.openxmlformats.org/officeDocument/2006/relationships" r:embed="rId3" cstate="print">
@@ -1662,7 +1773,7 @@
       </dgm:spPr>
     </dgm:pt>
     <dgm:pt modelId="{0BC8C099-42B8-4C5C-970B-13AB533D1129}" type="pres">
-      <dgm:prSet presAssocID="{C034EC04-B203-443F-A9D8-F90ED877BF90}" presName="txNode" presStyleLbl="node1" presStyleIdx="1" presStyleCnt="7">
+      <dgm:prSet presAssocID="{C034EC04-B203-443F-A9D8-F90ED877BF90}" presName="txNode" presStyleLbl="node1" presStyleIdx="1" presStyleCnt="8">
         <dgm:presLayoutVars>
           <dgm:bulletEnabled val="1"/>
         </dgm:presLayoutVars>
@@ -1670,11 +1781,11 @@
       <dgm:spPr/>
     </dgm:pt>
     <dgm:pt modelId="{DF0BE8DE-4ACD-4B7F-8F75-8D0EAF33EAA7}" type="pres">
-      <dgm:prSet presAssocID="{658121F9-2E8E-4D3F-B3C8-3D169BEA42ED}" presName="sibTrans" presStyleLbl="sibTrans2D1" presStyleIdx="1" presStyleCnt="6"/>
+      <dgm:prSet presAssocID="{658121F9-2E8E-4D3F-B3C8-3D169BEA42ED}" presName="sibTrans" presStyleLbl="sibTrans2D1" presStyleIdx="1" presStyleCnt="7"/>
       <dgm:spPr/>
     </dgm:pt>
     <dgm:pt modelId="{D973F9B2-5F24-42F7-9852-32072FFB50A0}" type="pres">
-      <dgm:prSet presAssocID="{658121F9-2E8E-4D3F-B3C8-3D169BEA42ED}" presName="connTx" presStyleLbl="sibTrans2D1" presStyleIdx="1" presStyleCnt="6"/>
+      <dgm:prSet presAssocID="{658121F9-2E8E-4D3F-B3C8-3D169BEA42ED}" presName="connTx" presStyleLbl="sibTrans2D1" presStyleIdx="1" presStyleCnt="7"/>
       <dgm:spPr/>
     </dgm:pt>
     <dgm:pt modelId="{BC2E6DEA-70AC-4ECD-98C8-45743CAFECD5}" type="pres">
@@ -1682,7 +1793,7 @@
       <dgm:spPr/>
     </dgm:pt>
     <dgm:pt modelId="{63FAF388-BCC7-4659-830F-F530F99DB4FB}" type="pres">
-      <dgm:prSet presAssocID="{1030C787-CF10-4D56-BEA0-03E3012FACA6}" presName="imagSh" presStyleLbl="bgImgPlace1" presStyleIdx="2" presStyleCnt="7"/>
+      <dgm:prSet presAssocID="{1030C787-CF10-4D56-BEA0-03E3012FACA6}" presName="imagSh" presStyleLbl="bgImgPlace1" presStyleIdx="2" presStyleCnt="8"/>
       <dgm:spPr>
         <a:blipFill>
           <a:blip xmlns:r="http://schemas.openxmlformats.org/officeDocument/2006/relationships" r:embed="rId5" cstate="print">
@@ -1703,7 +1814,7 @@
       </dgm:spPr>
     </dgm:pt>
     <dgm:pt modelId="{58629720-F9FB-4C0D-8663-25F4AF4AA144}" type="pres">
-      <dgm:prSet presAssocID="{1030C787-CF10-4D56-BEA0-03E3012FACA6}" presName="txNode" presStyleLbl="node1" presStyleIdx="2" presStyleCnt="7">
+      <dgm:prSet presAssocID="{1030C787-CF10-4D56-BEA0-03E3012FACA6}" presName="txNode" presStyleLbl="node1" presStyleIdx="2" presStyleCnt="8">
         <dgm:presLayoutVars>
           <dgm:bulletEnabled val="1"/>
         </dgm:presLayoutVars>
@@ -1711,11 +1822,11 @@
       <dgm:spPr/>
     </dgm:pt>
     <dgm:pt modelId="{8941FD1B-4CC5-4B55-8CA7-66B40572A22F}" type="pres">
-      <dgm:prSet presAssocID="{036930CE-FC33-4EAB-A8A2-479BB2151777}" presName="sibTrans" presStyleLbl="sibTrans2D1" presStyleIdx="2" presStyleCnt="6"/>
+      <dgm:prSet presAssocID="{036930CE-FC33-4EAB-A8A2-479BB2151777}" presName="sibTrans" presStyleLbl="sibTrans2D1" presStyleIdx="2" presStyleCnt="7"/>
       <dgm:spPr/>
     </dgm:pt>
     <dgm:pt modelId="{A4479AA0-3086-4904-8542-F1D7EB519121}" type="pres">
-      <dgm:prSet presAssocID="{036930CE-FC33-4EAB-A8A2-479BB2151777}" presName="connTx" presStyleLbl="sibTrans2D1" presStyleIdx="2" presStyleCnt="6"/>
+      <dgm:prSet presAssocID="{036930CE-FC33-4EAB-A8A2-479BB2151777}" presName="connTx" presStyleLbl="sibTrans2D1" presStyleIdx="2" presStyleCnt="7"/>
       <dgm:spPr/>
     </dgm:pt>
     <dgm:pt modelId="{5199618C-8A79-4AB1-B3FE-8E26B2D4DC11}" type="pres">
@@ -1723,11 +1834,11 @@
       <dgm:spPr/>
     </dgm:pt>
     <dgm:pt modelId="{4144B52C-CC49-46A2-A8D9-F85B7C5CF275}" type="pres">
-      <dgm:prSet presAssocID="{7410EC99-AE52-4CA9-9C4E-07B0CA008843}" presName="imagSh" presStyleLbl="bgImgPlace1" presStyleIdx="3" presStyleCnt="7"/>
+      <dgm:prSet presAssocID="{7410EC99-AE52-4CA9-9C4E-07B0CA008843}" presName="imagSh" presStyleLbl="bgImgPlace1" presStyleIdx="3" presStyleCnt="8"/>
       <dgm:spPr/>
     </dgm:pt>
     <dgm:pt modelId="{ECCD8E2B-A624-4082-B9F5-22F51A100E50}" type="pres">
-      <dgm:prSet presAssocID="{7410EC99-AE52-4CA9-9C4E-07B0CA008843}" presName="txNode" presStyleLbl="node1" presStyleIdx="3" presStyleCnt="7">
+      <dgm:prSet presAssocID="{7410EC99-AE52-4CA9-9C4E-07B0CA008843}" presName="txNode" presStyleLbl="node1" presStyleIdx="3" presStyleCnt="8">
         <dgm:presLayoutVars>
           <dgm:bulletEnabled val="1"/>
         </dgm:presLayoutVars>
@@ -1735,11 +1846,11 @@
       <dgm:spPr/>
     </dgm:pt>
     <dgm:pt modelId="{B00397B1-61FD-4348-AAE0-9BCCC71B097A}" type="pres">
-      <dgm:prSet presAssocID="{E6468721-A96A-4327-9AC8-2BAB26C9EBF6}" presName="sibTrans" presStyleLbl="sibTrans2D1" presStyleIdx="3" presStyleCnt="6"/>
+      <dgm:prSet presAssocID="{E6468721-A96A-4327-9AC8-2BAB26C9EBF6}" presName="sibTrans" presStyleLbl="sibTrans2D1" presStyleIdx="3" presStyleCnt="7"/>
       <dgm:spPr/>
     </dgm:pt>
     <dgm:pt modelId="{D3E1C650-9E88-4F7C-91F3-4126C21E3985}" type="pres">
-      <dgm:prSet presAssocID="{E6468721-A96A-4327-9AC8-2BAB26C9EBF6}" presName="connTx" presStyleLbl="sibTrans2D1" presStyleIdx="3" presStyleCnt="6"/>
+      <dgm:prSet presAssocID="{E6468721-A96A-4327-9AC8-2BAB26C9EBF6}" presName="connTx" presStyleLbl="sibTrans2D1" presStyleIdx="3" presStyleCnt="7"/>
       <dgm:spPr/>
     </dgm:pt>
     <dgm:pt modelId="{7B8FFC7A-FE09-4E6C-8ADF-EEBB4EDCF926}" type="pres">
@@ -1747,11 +1858,11 @@
       <dgm:spPr/>
     </dgm:pt>
     <dgm:pt modelId="{9E90FAA2-7F73-47A6-9ECD-6B83C75E0D8D}" type="pres">
-      <dgm:prSet presAssocID="{69C55802-23EA-4B44-9F38-7EC100B71B20}" presName="imagSh" presStyleLbl="bgImgPlace1" presStyleIdx="4" presStyleCnt="7"/>
+      <dgm:prSet presAssocID="{69C55802-23EA-4B44-9F38-7EC100B71B20}" presName="imagSh" presStyleLbl="bgImgPlace1" presStyleIdx="4" presStyleCnt="8"/>
       <dgm:spPr/>
     </dgm:pt>
     <dgm:pt modelId="{56910574-621B-47D8-9757-86E2FDBD47BC}" type="pres">
-      <dgm:prSet presAssocID="{69C55802-23EA-4B44-9F38-7EC100B71B20}" presName="txNode" presStyleLbl="node1" presStyleIdx="4" presStyleCnt="7">
+      <dgm:prSet presAssocID="{69C55802-23EA-4B44-9F38-7EC100B71B20}" presName="txNode" presStyleLbl="node1" presStyleIdx="4" presStyleCnt="8">
         <dgm:presLayoutVars>
           <dgm:bulletEnabled val="1"/>
         </dgm:presLayoutVars>
@@ -1759,11 +1870,11 @@
       <dgm:spPr/>
     </dgm:pt>
     <dgm:pt modelId="{41FC4363-C730-4E78-A8DB-01F5BC2CA415}" type="pres">
-      <dgm:prSet presAssocID="{22F9CF2D-E206-4AA7-9D67-9FBD7A6BCE80}" presName="sibTrans" presStyleLbl="sibTrans2D1" presStyleIdx="4" presStyleCnt="6"/>
+      <dgm:prSet presAssocID="{22F9CF2D-E206-4AA7-9D67-9FBD7A6BCE80}" presName="sibTrans" presStyleLbl="sibTrans2D1" presStyleIdx="4" presStyleCnt="7"/>
       <dgm:spPr/>
     </dgm:pt>
     <dgm:pt modelId="{27C76371-14FF-49CA-A51A-82A1D54DA5A0}" type="pres">
-      <dgm:prSet presAssocID="{22F9CF2D-E206-4AA7-9D67-9FBD7A6BCE80}" presName="connTx" presStyleLbl="sibTrans2D1" presStyleIdx="4" presStyleCnt="6"/>
+      <dgm:prSet presAssocID="{22F9CF2D-E206-4AA7-9D67-9FBD7A6BCE80}" presName="connTx" presStyleLbl="sibTrans2D1" presStyleIdx="4" presStyleCnt="7"/>
       <dgm:spPr/>
     </dgm:pt>
     <dgm:pt modelId="{60531984-9833-4CF4-9329-49254376B9AA}" type="pres">
@@ -1771,11 +1882,11 @@
       <dgm:spPr/>
     </dgm:pt>
     <dgm:pt modelId="{65A28B11-E8F9-4108-9737-E10393245391}" type="pres">
-      <dgm:prSet presAssocID="{BCD8641E-439E-4199-B666-B95A3BE37B1A}" presName="imagSh" presStyleLbl="bgImgPlace1" presStyleIdx="5" presStyleCnt="7"/>
+      <dgm:prSet presAssocID="{BCD8641E-439E-4199-B666-B95A3BE37B1A}" presName="imagSh" presStyleLbl="bgImgPlace1" presStyleIdx="5" presStyleCnt="8"/>
       <dgm:spPr/>
     </dgm:pt>
     <dgm:pt modelId="{427A4CCC-BF9A-457E-AC67-55BB7BE495F7}" type="pres">
-      <dgm:prSet presAssocID="{BCD8641E-439E-4199-B666-B95A3BE37B1A}" presName="txNode" presStyleLbl="node1" presStyleIdx="5" presStyleCnt="7">
+      <dgm:prSet presAssocID="{BCD8641E-439E-4199-B666-B95A3BE37B1A}" presName="txNode" presStyleLbl="node1" presStyleIdx="5" presStyleCnt="8">
         <dgm:presLayoutVars>
           <dgm:bulletEnabled val="1"/>
         </dgm:presLayoutVars>
@@ -1783,11 +1894,11 @@
       <dgm:spPr/>
     </dgm:pt>
     <dgm:pt modelId="{6496C8A7-1AAA-4520-9452-570B6004501A}" type="pres">
-      <dgm:prSet presAssocID="{99B8820B-A826-4E6F-9E64-BD7D45963766}" presName="sibTrans" presStyleLbl="sibTrans2D1" presStyleIdx="5" presStyleCnt="6"/>
+      <dgm:prSet presAssocID="{99B8820B-A826-4E6F-9E64-BD7D45963766}" presName="sibTrans" presStyleLbl="sibTrans2D1" presStyleIdx="5" presStyleCnt="7"/>
       <dgm:spPr/>
     </dgm:pt>
     <dgm:pt modelId="{EFCEE486-59F5-41C2-ACC9-152B7B5B0804}" type="pres">
-      <dgm:prSet presAssocID="{99B8820B-A826-4E6F-9E64-BD7D45963766}" presName="connTx" presStyleLbl="sibTrans2D1" presStyleIdx="5" presStyleCnt="6"/>
+      <dgm:prSet presAssocID="{99B8820B-A826-4E6F-9E64-BD7D45963766}" presName="connTx" presStyleLbl="sibTrans2D1" presStyleIdx="5" presStyleCnt="7"/>
       <dgm:spPr/>
     </dgm:pt>
     <dgm:pt modelId="{2E29F185-AFF2-4DCA-9225-AD2838FF2F1C}" type="pres">
@@ -1795,11 +1906,35 @@
       <dgm:spPr/>
     </dgm:pt>
     <dgm:pt modelId="{678EB37A-483E-4CAF-8A44-DB356EA82EAF}" type="pres">
-      <dgm:prSet presAssocID="{47291841-0B8F-4DD0-B587-1F2849BE57E7}" presName="imagSh" presStyleLbl="bgImgPlace1" presStyleIdx="6" presStyleCnt="7"/>
+      <dgm:prSet presAssocID="{47291841-0B8F-4DD0-B587-1F2849BE57E7}" presName="imagSh" presStyleLbl="bgImgPlace1" presStyleIdx="6" presStyleCnt="8"/>
       <dgm:spPr/>
     </dgm:pt>
     <dgm:pt modelId="{C3D8E103-FFA8-410C-992B-7891964508CF}" type="pres">
-      <dgm:prSet presAssocID="{47291841-0B8F-4DD0-B587-1F2849BE57E7}" presName="txNode" presStyleLbl="node1" presStyleIdx="6" presStyleCnt="7">
+      <dgm:prSet presAssocID="{47291841-0B8F-4DD0-B587-1F2849BE57E7}" presName="txNode" presStyleLbl="node1" presStyleIdx="6" presStyleCnt="8">
+        <dgm:presLayoutVars>
+          <dgm:bulletEnabled val="1"/>
+        </dgm:presLayoutVars>
+      </dgm:prSet>
+      <dgm:spPr/>
+    </dgm:pt>
+    <dgm:pt modelId="{C58AB711-1DC7-4981-A453-C58359394264}" type="pres">
+      <dgm:prSet presAssocID="{6D82CE98-B6C8-4C6D-AF9C-699904EAAB11}" presName="sibTrans" presStyleLbl="sibTrans2D1" presStyleIdx="6" presStyleCnt="7"/>
+      <dgm:spPr/>
+    </dgm:pt>
+    <dgm:pt modelId="{76E9098F-739C-4C59-A49C-C4C93537D6D1}" type="pres">
+      <dgm:prSet presAssocID="{6D82CE98-B6C8-4C6D-AF9C-699904EAAB11}" presName="connTx" presStyleLbl="sibTrans2D1" presStyleIdx="6" presStyleCnt="7"/>
+      <dgm:spPr/>
+    </dgm:pt>
+    <dgm:pt modelId="{71D270B4-E266-4044-B0D2-F9CE0B6D2FE7}" type="pres">
+      <dgm:prSet presAssocID="{0691445B-1196-4650-BA5A-7CD5A3350553}" presName="composite" presStyleCnt="0"/>
+      <dgm:spPr/>
+    </dgm:pt>
+    <dgm:pt modelId="{FB8456C6-DA59-4B6F-9149-905C8B0A5903}" type="pres">
+      <dgm:prSet presAssocID="{0691445B-1196-4650-BA5A-7CD5A3350553}" presName="imagSh" presStyleLbl="bgImgPlace1" presStyleIdx="7" presStyleCnt="8"/>
+      <dgm:spPr/>
+    </dgm:pt>
+    <dgm:pt modelId="{F6934BC3-D1C6-4B65-8251-F4877F052B8F}" type="pres">
+      <dgm:prSet presAssocID="{0691445B-1196-4650-BA5A-7CD5A3350553}" presName="txNode" presStyleLbl="node1" presStyleIdx="7" presStyleCnt="8">
         <dgm:presLayoutVars>
           <dgm:bulletEnabled val="1"/>
         </dgm:presLayoutVars>
@@ -1815,6 +1950,7 @@
     <dgm:cxn modelId="{73141020-3945-411F-A241-BC9220484465}" type="presOf" srcId="{F90E83AB-31C8-4813-82DD-2C756B83D980}" destId="{C3D8E103-FFA8-410C-992B-7891964508CF}" srcOrd="0" destOrd="2" presId="urn:microsoft.com/office/officeart/2005/8/layout/hProcess10"/>
     <dgm:cxn modelId="{73EDAA22-2D85-4F02-BA69-67A6AA46EDA5}" type="presOf" srcId="{1D7F6ABF-BF36-432F-A5B6-1097B1359EDB}" destId="{0BC8C099-42B8-4C5C-970B-13AB533D1129}" srcOrd="0" destOrd="3" presId="urn:microsoft.com/office/officeart/2005/8/layout/hProcess10"/>
     <dgm:cxn modelId="{9F6CB526-0FD1-469F-AD5B-25D2A99749EF}" srcId="{1030C787-CF10-4D56-BEA0-03E3012FACA6}" destId="{654BF433-E40F-45B9-A37E-C8F9FD609154}" srcOrd="0" destOrd="0" parTransId="{1C66D073-6ED8-44D1-A482-2906E6D29200}" sibTransId="{85E969D4-CA78-47B2-AA0D-436740DA8D17}"/>
+    <dgm:cxn modelId="{EBF72B29-7031-4941-912C-55738C0911FA}" type="presOf" srcId="{0691445B-1196-4650-BA5A-7CD5A3350553}" destId="{F6934BC3-D1C6-4B65-8251-F4877F052B8F}" srcOrd="0" destOrd="0" presId="urn:microsoft.com/office/officeart/2005/8/layout/hProcess10"/>
     <dgm:cxn modelId="{EE7CD72C-3404-45A8-9D90-1F29013BA6C3}" type="presOf" srcId="{EC1343D2-3E7C-4518-842F-A256DE48FAFB}" destId="{427A4CCC-BF9A-457E-AC67-55BB7BE495F7}" srcOrd="0" destOrd="1" presId="urn:microsoft.com/office/officeart/2005/8/layout/hProcess10"/>
     <dgm:cxn modelId="{4C77CB30-C578-4FCF-8D62-7EA627615C3D}" type="presOf" srcId="{04006EDA-2BF5-4C38-9697-E35D1BE6F788}" destId="{96B4A9A9-9508-4DDC-BDDD-6C847151EA0D}" srcOrd="0" destOrd="2" presId="urn:microsoft.com/office/officeart/2005/8/layout/hProcess10"/>
     <dgm:cxn modelId="{BDEB7B38-D66B-481B-8253-C9BC16E4CF38}" type="presOf" srcId="{658121F9-2E8E-4D3F-B3C8-3D169BEA42ED}" destId="{D973F9B2-5F24-42F7-9852-32072FFB50A0}" srcOrd="1" destOrd="0" presId="urn:microsoft.com/office/officeart/2005/8/layout/hProcess10"/>
@@ -1823,8 +1959,10 @@
     <dgm:cxn modelId="{B60D025D-7E13-40D3-8B3D-E30A91483CB1}" srcId="{F4790FF3-1826-421D-BEB6-E5A90514D83B}" destId="{883735A2-714B-48EE-A800-768FAD84BB90}" srcOrd="2" destOrd="0" parTransId="{C832555F-D2F1-4C64-B824-87FD640DD6C5}" sibTransId="{8DBB98AB-BD23-4E7D-A2D4-3DA77953100C}"/>
     <dgm:cxn modelId="{DDEC7C5D-7805-4F28-B4C1-D9D1A746AE63}" type="presOf" srcId="{FC2E7C28-996D-4FE3-AF8A-5E76B248663F}" destId="{56910574-621B-47D8-9757-86E2FDBD47BC}" srcOrd="0" destOrd="1" presId="urn:microsoft.com/office/officeart/2005/8/layout/hProcess10"/>
     <dgm:cxn modelId="{FA7E4660-163D-4C5E-9A06-8253FE4D46A3}" srcId="{C034EC04-B203-443F-A9D8-F90ED877BF90}" destId="{1D7F6ABF-BF36-432F-A5B6-1097B1359EDB}" srcOrd="2" destOrd="0" parTransId="{A2C8E860-456A-4586-8DCD-CDF4681217F2}" sibTransId="{F00D09BD-0D97-4452-BD4E-A86F94DD7A90}"/>
+    <dgm:cxn modelId="{7615E644-DBA7-4E1B-9D08-8FCF11FF8A80}" srcId="{0691445B-1196-4650-BA5A-7CD5A3350553}" destId="{1059B3D3-915E-4391-8D5F-E03C7752CAFB}" srcOrd="0" destOrd="0" parTransId="{9701CBAF-58C8-48AB-B129-AE53B786ECF3}" sibTransId="{D16BBFAF-D28E-499C-AA88-A087268EDD84}"/>
     <dgm:cxn modelId="{0971E744-EC1F-4C34-9DF9-56DBFA0E2A7A}" srcId="{05A2A666-C2AA-44F5-AE5E-B6D075A8A01C}" destId="{1030C787-CF10-4D56-BEA0-03E3012FACA6}" srcOrd="2" destOrd="0" parTransId="{165EE207-D862-4881-B0D4-0C2F4FDF701C}" sibTransId="{036930CE-FC33-4EAB-A8A2-479BB2151777}"/>
     <dgm:cxn modelId="{F622DC45-1115-4651-B32B-D2823EEABBEC}" type="presOf" srcId="{99B8820B-A826-4E6F-9E64-BD7D45963766}" destId="{EFCEE486-59F5-41C2-ACC9-152B7B5B0804}" srcOrd="1" destOrd="0" presId="urn:microsoft.com/office/officeart/2005/8/layout/hProcess10"/>
+    <dgm:cxn modelId="{0375C84A-24CD-415A-93AA-27935D1E4C1D}" srcId="{0691445B-1196-4650-BA5A-7CD5A3350553}" destId="{5E3574A7-A551-4BE6-B3D6-61FD3F1C0B90}" srcOrd="1" destOrd="0" parTransId="{F662931B-9EC7-404B-AC8A-569B077EF776}" sibTransId="{734AEECF-7235-421F-A044-87B64C62A4C5}"/>
     <dgm:cxn modelId="{E693EA6A-257D-4F14-8F8D-008102F0ACCE}" type="presOf" srcId="{7410EC99-AE52-4CA9-9C4E-07B0CA008843}" destId="{ECCD8E2B-A624-4082-B9F5-22F51A100E50}" srcOrd="0" destOrd="0" presId="urn:microsoft.com/office/officeart/2005/8/layout/hProcess10"/>
     <dgm:cxn modelId="{B0D0894B-4937-4AAD-84E4-CE7853B096D9}" srcId="{05A2A666-C2AA-44F5-AE5E-B6D075A8A01C}" destId="{F4790FF3-1826-421D-BEB6-E5A90514D83B}" srcOrd="0" destOrd="0" parTransId="{88E1844D-0365-4E7C-BD39-76FE50E71BF5}" sibTransId="{C95D1DD7-0EDC-46B7-8BF5-4F95326559DE}"/>
     <dgm:cxn modelId="{3A925A4E-D938-4FEA-B67F-4F04145B0A9A}" type="presOf" srcId="{47291841-0B8F-4DD0-B587-1F2849BE57E7}" destId="{C3D8E103-FFA8-410C-992B-7891964508CF}" srcOrd="0" destOrd="0" presId="urn:microsoft.com/office/officeart/2005/8/layout/hProcess10"/>
@@ -1841,15 +1979,20 @@
     <dgm:cxn modelId="{2078338C-EF49-43FE-96AC-BEF42DB18009}" srcId="{47291841-0B8F-4DD0-B587-1F2849BE57E7}" destId="{C65C02F7-BB60-471E-BECB-19BA044FD2E1}" srcOrd="0" destOrd="0" parTransId="{FEC7F497-71FF-4556-A558-B7C975AF9C6F}" sibTransId="{98A11A4A-11DB-4258-82C1-F95B0EA1DA61}"/>
     <dgm:cxn modelId="{96A6FD8E-96DB-425A-9756-BE87EFEA1945}" type="presOf" srcId="{036930CE-FC33-4EAB-A8A2-479BB2151777}" destId="{A4479AA0-3086-4904-8542-F1D7EB519121}" srcOrd="1" destOrd="0" presId="urn:microsoft.com/office/officeart/2005/8/layout/hProcess10"/>
     <dgm:cxn modelId="{D91F6390-AD21-4A7F-B33C-037DDBD1EF73}" type="presOf" srcId="{E6468721-A96A-4327-9AC8-2BAB26C9EBF6}" destId="{B00397B1-61FD-4348-AAE0-9BCCC71B097A}" srcOrd="0" destOrd="0" presId="urn:microsoft.com/office/officeart/2005/8/layout/hProcess10"/>
+    <dgm:cxn modelId="{E9F35396-7E4D-4543-9FF1-9304B5CC92E2}" type="presOf" srcId="{6D82CE98-B6C8-4C6D-AF9C-699904EAAB11}" destId="{76E9098F-739C-4C59-A49C-C4C93537D6D1}" srcOrd="1" destOrd="0" presId="urn:microsoft.com/office/officeart/2005/8/layout/hProcess10"/>
     <dgm:cxn modelId="{75127699-D2D2-4059-911C-7D8CAD75C7A5}" type="presOf" srcId="{C95D1DD7-0EDC-46B7-8BF5-4F95326559DE}" destId="{9BB52CFD-5C58-411C-B16F-247FCA4BC3EF}" srcOrd="1" destOrd="0" presId="urn:microsoft.com/office/officeart/2005/8/layout/hProcess10"/>
     <dgm:cxn modelId="{0DC912A0-36C7-427B-B35C-A581F7E752F5}" type="presOf" srcId="{22F9CF2D-E206-4AA7-9D67-9FBD7A6BCE80}" destId="{27C76371-14FF-49CA-A51A-82A1D54DA5A0}" srcOrd="1" destOrd="0" presId="urn:microsoft.com/office/officeart/2005/8/layout/hProcess10"/>
     <dgm:cxn modelId="{4F0244A4-3C0D-40C6-BE43-807235BE09B4}" type="presOf" srcId="{6D45BA2D-E184-4086-8512-FB27F8237481}" destId="{0BC8C099-42B8-4C5C-970B-13AB533D1129}" srcOrd="0" destOrd="1" presId="urn:microsoft.com/office/officeart/2005/8/layout/hProcess10"/>
+    <dgm:cxn modelId="{8C8E1FA7-BE27-4E3B-9F86-6B0A4C507166}" srcId="{05A2A666-C2AA-44F5-AE5E-B6D075A8A01C}" destId="{0691445B-1196-4650-BA5A-7CD5A3350553}" srcOrd="7" destOrd="0" parTransId="{5DA4DA25-D2F8-41BF-B536-2C40DBB746D7}" sibTransId="{03B9520E-EF56-420A-B5DF-52B5D9F7A6A5}"/>
     <dgm:cxn modelId="{98C0C1A9-2A51-4ACC-BA15-44225AAEE321}" type="presOf" srcId="{883735A2-714B-48EE-A800-768FAD84BB90}" destId="{96B4A9A9-9508-4DDC-BDDD-6C847151EA0D}" srcOrd="0" destOrd="3" presId="urn:microsoft.com/office/officeart/2005/8/layout/hProcess10"/>
     <dgm:cxn modelId="{AB7E9DAF-EB49-416F-9D02-C77BE9F9DA12}" type="presOf" srcId="{C034EC04-B203-443F-A9D8-F90ED877BF90}" destId="{0BC8C099-42B8-4C5C-970B-13AB533D1129}" srcOrd="0" destOrd="0" presId="urn:microsoft.com/office/officeart/2005/8/layout/hProcess10"/>
     <dgm:cxn modelId="{9E6F72B0-7D90-4BD4-8EC6-3129AA0BBDEF}" type="presOf" srcId="{C95D1DD7-0EDC-46B7-8BF5-4F95326559DE}" destId="{3BFE17F0-16D8-410B-9E73-9189BA87476A}" srcOrd="0" destOrd="0" presId="urn:microsoft.com/office/officeart/2005/8/layout/hProcess10"/>
+    <dgm:cxn modelId="{5D2759B0-327C-4B51-97C3-E4E3A6895C4D}" type="presOf" srcId="{6D82CE98-B6C8-4C6D-AF9C-699904EAAB11}" destId="{C58AB711-1DC7-4981-A453-C58359394264}" srcOrd="0" destOrd="0" presId="urn:microsoft.com/office/officeart/2005/8/layout/hProcess10"/>
     <dgm:cxn modelId="{397A3EB4-FABD-4E38-86C4-6AE7CCACE725}" srcId="{05A2A666-C2AA-44F5-AE5E-B6D075A8A01C}" destId="{BCD8641E-439E-4199-B666-B95A3BE37B1A}" srcOrd="5" destOrd="0" parTransId="{FFE12A04-1403-4A2E-B4F4-13CE057E3FC0}" sibTransId="{99B8820B-A826-4E6F-9E64-BD7D45963766}"/>
+    <dgm:cxn modelId="{0F0D28B8-E466-4D2F-9E93-29C4E2011446}" type="presOf" srcId="{1059B3D3-915E-4391-8D5F-E03C7752CAFB}" destId="{F6934BC3-D1C6-4B65-8251-F4877F052B8F}" srcOrd="0" destOrd="1" presId="urn:microsoft.com/office/officeart/2005/8/layout/hProcess10"/>
     <dgm:cxn modelId="{94B877CC-A29B-4DED-A7E4-40EEA8C9FFCF}" srcId="{BCD8641E-439E-4199-B666-B95A3BE37B1A}" destId="{EC1343D2-3E7C-4518-842F-A256DE48FAFB}" srcOrd="0" destOrd="0" parTransId="{07838837-B470-47F3-B25E-C17613B828AF}" sibTransId="{EBD89D4E-0987-4904-8CC2-C12561561E47}"/>
     <dgm:cxn modelId="{2A7603CE-8E74-4E8A-9708-9F6D4DF56AB7}" type="presOf" srcId="{05A2A666-C2AA-44F5-AE5E-B6D075A8A01C}" destId="{486D9A37-AB3F-4BD7-A508-0857317AB0AB}" srcOrd="0" destOrd="0" presId="urn:microsoft.com/office/officeart/2005/8/layout/hProcess10"/>
+    <dgm:cxn modelId="{4AFD21D1-7393-4038-AC69-4600BF75C8D6}" type="presOf" srcId="{5E3574A7-A551-4BE6-B3D6-61FD3F1C0B90}" destId="{F6934BC3-D1C6-4B65-8251-F4877F052B8F}" srcOrd="0" destOrd="2" presId="urn:microsoft.com/office/officeart/2005/8/layout/hProcess10"/>
     <dgm:cxn modelId="{1AB7B8D3-6750-410B-B19F-4E394E8A8E98}" srcId="{F4790FF3-1826-421D-BEB6-E5A90514D83B}" destId="{04006EDA-2BF5-4C38-9697-E35D1BE6F788}" srcOrd="1" destOrd="0" parTransId="{AB7E6199-DAE5-4D7C-BE73-504E5F99CF48}" sibTransId="{E9DFBE2F-70C1-4681-BCA4-B5A7AD772FB1}"/>
     <dgm:cxn modelId="{46ACD4D3-93FE-4F41-B7D2-E564C2578835}" type="presOf" srcId="{69C55802-23EA-4B44-9F38-7EC100B71B20}" destId="{56910574-621B-47D8-9757-86E2FDBD47BC}" srcOrd="0" destOrd="0" presId="urn:microsoft.com/office/officeart/2005/8/layout/hProcess10"/>
     <dgm:cxn modelId="{DA9014D7-69B8-4FC2-AA41-64E6E9A58B50}" type="presOf" srcId="{BCD8641E-439E-4199-B666-B95A3BE37B1A}" destId="{427A4CCC-BF9A-457E-AC67-55BB7BE495F7}" srcOrd="0" destOrd="0" presId="urn:microsoft.com/office/officeart/2005/8/layout/hProcess10"/>
@@ -1892,6 +2035,11 @@
     <dgm:cxn modelId="{18A42892-23B0-424D-A6EF-306859D626A3}" type="presParOf" srcId="{486D9A37-AB3F-4BD7-A508-0857317AB0AB}" destId="{2E29F185-AFF2-4DCA-9225-AD2838FF2F1C}" srcOrd="12" destOrd="0" presId="urn:microsoft.com/office/officeart/2005/8/layout/hProcess10"/>
     <dgm:cxn modelId="{EACB2D58-0EA0-422D-99FB-8DE148A694FF}" type="presParOf" srcId="{2E29F185-AFF2-4DCA-9225-AD2838FF2F1C}" destId="{678EB37A-483E-4CAF-8A44-DB356EA82EAF}" srcOrd="0" destOrd="0" presId="urn:microsoft.com/office/officeart/2005/8/layout/hProcess10"/>
     <dgm:cxn modelId="{EC9024D8-35C8-4B52-B7F9-9B0C3EF974C6}" type="presParOf" srcId="{2E29F185-AFF2-4DCA-9225-AD2838FF2F1C}" destId="{C3D8E103-FFA8-410C-992B-7891964508CF}" srcOrd="1" destOrd="0" presId="urn:microsoft.com/office/officeart/2005/8/layout/hProcess10"/>
+    <dgm:cxn modelId="{B83E9201-65A8-4EC5-8DD8-FEF3E00462D7}" type="presParOf" srcId="{486D9A37-AB3F-4BD7-A508-0857317AB0AB}" destId="{C58AB711-1DC7-4981-A453-C58359394264}" srcOrd="13" destOrd="0" presId="urn:microsoft.com/office/officeart/2005/8/layout/hProcess10"/>
+    <dgm:cxn modelId="{EB2E65ED-2187-47E4-A31B-866136D230BF}" type="presParOf" srcId="{C58AB711-1DC7-4981-A453-C58359394264}" destId="{76E9098F-739C-4C59-A49C-C4C93537D6D1}" srcOrd="0" destOrd="0" presId="urn:microsoft.com/office/officeart/2005/8/layout/hProcess10"/>
+    <dgm:cxn modelId="{C9F98DFF-E847-471E-9E3B-3B0ABC1A3A68}" type="presParOf" srcId="{486D9A37-AB3F-4BD7-A508-0857317AB0AB}" destId="{71D270B4-E266-4044-B0D2-F9CE0B6D2FE7}" srcOrd="14" destOrd="0" presId="urn:microsoft.com/office/officeart/2005/8/layout/hProcess10"/>
+    <dgm:cxn modelId="{AB268906-0312-4E35-86E0-80981B85CE8E}" type="presParOf" srcId="{71D270B4-E266-4044-B0D2-F9CE0B6D2FE7}" destId="{FB8456C6-DA59-4B6F-9149-905C8B0A5903}" srcOrd="0" destOrd="0" presId="urn:microsoft.com/office/officeart/2005/8/layout/hProcess10"/>
+    <dgm:cxn modelId="{1CEB55BE-816D-40DB-87B8-158A71533B0A}" type="presParOf" srcId="{71D270B4-E266-4044-B0D2-F9CE0B6D2FE7}" destId="{F6934BC3-D1C6-4B65-8251-F4877F052B8F}" srcOrd="1" destOrd="0" presId="urn:microsoft.com/office/officeart/2005/8/layout/hProcess10"/>
   </dgm:cxnLst>
   <dgm:bg/>
   <dgm:whole/>
@@ -1918,8 +2066,8 @@
       </dsp:nvSpPr>
       <dsp:spPr>
         <a:xfrm>
-          <a:off x="1096" y="1634027"/>
-          <a:ext cx="786192" cy="786192"/>
+          <a:off x="4111" y="1715584"/>
+          <a:ext cx="684246" cy="684246"/>
         </a:xfrm>
         <a:prstGeom prst="roundRect">
           <a:avLst>
@@ -1975,8 +2123,8 @@
       </dsp:nvSpPr>
       <dsp:spPr>
         <a:xfrm>
-          <a:off x="129080" y="2105743"/>
-          <a:ext cx="786192" cy="786192"/>
+          <a:off x="115500" y="2126132"/>
+          <a:ext cx="684246" cy="684246"/>
         </a:xfrm>
         <a:prstGeom prst="roundRect">
           <a:avLst>
@@ -2019,12 +2167,12 @@
         </a:fontRef>
       </dsp:style>
       <dsp:txBody>
-        <a:bodyPr spcFirstLastPara="0" vert="horz" wrap="square" lIns="34290" tIns="34290" rIns="34290" bIns="34290" numCol="1" spcCol="1270" anchor="t" anchorCtr="0">
+        <a:bodyPr spcFirstLastPara="0" vert="horz" wrap="square" lIns="30480" tIns="30480" rIns="30480" bIns="30480" numCol="1" spcCol="1270" anchor="t" anchorCtr="0">
           <a:noAutofit/>
         </a:bodyPr>
         <a:lstStyle/>
         <a:p>
-          <a:pPr marL="0" lvl="0" indent="0" algn="l" defTabSz="400050">
+          <a:pPr marL="0" lvl="0" indent="0" algn="l" defTabSz="355600">
             <a:lnSpc>
               <a:spcPct val="90000"/>
             </a:lnSpc>
@@ -2037,12 +2185,12 @@
             <a:buNone/>
           </a:pPr>
           <a:r>
-            <a:rPr lang="en-US" sz="900" kern="1200" dirty="0"/>
+            <a:rPr lang="en-US" sz="800" kern="1200" dirty="0"/>
             <a:t>IaaS</a:t>
           </a:r>
         </a:p>
         <a:p>
-          <a:pPr marL="57150" lvl="1" indent="-57150" algn="l" defTabSz="311150">
+          <a:pPr marL="57150" lvl="1" indent="-57150" algn="l" defTabSz="266700">
             <a:lnSpc>
               <a:spcPct val="90000"/>
             </a:lnSpc>
@@ -2055,12 +2203,12 @@
             <a:buChar char="•"/>
           </a:pPr>
           <a:r>
-            <a:rPr lang="en-US" sz="700" kern="1200" dirty="0"/>
+            <a:rPr lang="en-US" sz="600" kern="1200" dirty="0"/>
             <a:t>Windows Server</a:t>
           </a:r>
         </a:p>
         <a:p>
-          <a:pPr marL="57150" lvl="1" indent="-57150" algn="l" defTabSz="311150">
+          <a:pPr marL="57150" lvl="1" indent="-57150" algn="l" defTabSz="266700">
             <a:lnSpc>
               <a:spcPct val="90000"/>
             </a:lnSpc>
@@ -2073,12 +2221,12 @@
             <a:buChar char="•"/>
           </a:pPr>
           <a:r>
-            <a:rPr lang="en-US" sz="700" kern="1200" dirty="0"/>
+            <a:rPr lang="en-US" sz="600" kern="1200" dirty="0"/>
             <a:t>Linux</a:t>
           </a:r>
         </a:p>
         <a:p>
-          <a:pPr marL="57150" lvl="1" indent="-57150" algn="l" defTabSz="311150">
+          <a:pPr marL="57150" lvl="1" indent="-57150" algn="l" defTabSz="266700">
             <a:lnSpc>
               <a:spcPct val="90000"/>
             </a:lnSpc>
@@ -2091,14 +2239,14 @@
             <a:buChar char="•"/>
           </a:pPr>
           <a:r>
-            <a:rPr lang="en-US" sz="700" kern="1200" dirty="0"/>
+            <a:rPr lang="en-US" sz="600" kern="1200" dirty="0"/>
             <a:t>container</a:t>
           </a:r>
         </a:p>
       </dsp:txBody>
       <dsp:txXfrm>
-        <a:off x="152107" y="2128770"/>
-        <a:ext cx="740138" cy="740138"/>
+        <a:off x="135541" y="2146173"/>
+        <a:ext cx="644164" cy="644164"/>
       </dsp:txXfrm>
     </dsp:sp>
     <dsp:sp modelId="{3BFE17F0-16D8-410B-9E73-9189BA87476A}">
@@ -2108,8 +2256,8 @@
       </dsp:nvSpPr>
       <dsp:spPr>
         <a:xfrm>
-          <a:off x="938725" y="1932668"/>
-          <a:ext cx="151437" cy="188910"/>
+          <a:off x="820158" y="1975500"/>
+          <a:ext cx="131800" cy="164414"/>
         </a:xfrm>
         <a:prstGeom prst="rightArrow">
           <a:avLst>
@@ -2151,7 +2299,7 @@
         </a:bodyPr>
         <a:lstStyle/>
         <a:p>
-          <a:pPr marL="0" lvl="0" indent="0" algn="ctr" defTabSz="311150">
+          <a:pPr marL="0" lvl="0" indent="0" algn="ctr" defTabSz="266700">
             <a:lnSpc>
               <a:spcPct val="90000"/>
             </a:lnSpc>
@@ -2163,12 +2311,12 @@
             </a:spcAft>
             <a:buNone/>
           </a:pPr>
-          <a:endParaRPr lang="en-US" sz="700" kern="1200"/>
+          <a:endParaRPr lang="en-US" sz="600" kern="1200"/>
         </a:p>
       </dsp:txBody>
       <dsp:txXfrm>
-        <a:off x="938725" y="1970450"/>
-        <a:ext cx="106006" cy="113346"/>
+        <a:off x="820158" y="2008383"/>
+        <a:ext cx="92260" cy="98648"/>
       </dsp:txXfrm>
     </dsp:sp>
     <dsp:sp modelId="{C7F830C1-9D38-49F4-81F8-C1A18AECBC64}">
@@ -2178,8 +2326,8 @@
       </dsp:nvSpPr>
       <dsp:spPr>
         <a:xfrm>
-          <a:off x="1219967" y="1634027"/>
-          <a:ext cx="786192" cy="786192"/>
+          <a:off x="1064931" y="1715584"/>
+          <a:ext cx="684246" cy="684246"/>
         </a:xfrm>
         <a:prstGeom prst="roundRect">
           <a:avLst>
@@ -2235,8 +2383,8 @@
       </dsp:nvSpPr>
       <dsp:spPr>
         <a:xfrm>
-          <a:off x="1347952" y="2105743"/>
-          <a:ext cx="786192" cy="786192"/>
+          <a:off x="1176320" y="2126132"/>
+          <a:ext cx="684246" cy="684246"/>
         </a:xfrm>
         <a:prstGeom prst="roundRect">
           <a:avLst>
@@ -2279,12 +2427,12 @@
         </a:fontRef>
       </dsp:style>
       <dsp:txBody>
-        <a:bodyPr spcFirstLastPara="0" vert="horz" wrap="square" lIns="34290" tIns="34290" rIns="34290" bIns="34290" numCol="1" spcCol="1270" anchor="t" anchorCtr="0">
+        <a:bodyPr spcFirstLastPara="0" vert="horz" wrap="square" lIns="30480" tIns="30480" rIns="30480" bIns="30480" numCol="1" spcCol="1270" anchor="t" anchorCtr="0">
           <a:noAutofit/>
         </a:bodyPr>
         <a:lstStyle/>
         <a:p>
-          <a:pPr marL="0" lvl="0" indent="0" algn="l" defTabSz="400050">
+          <a:pPr marL="0" lvl="0" indent="0" algn="l" defTabSz="355600">
             <a:lnSpc>
               <a:spcPct val="90000"/>
             </a:lnSpc>
@@ -2297,13 +2445,13 @@
             <a:buNone/>
           </a:pPr>
           <a:r>
-            <a:rPr lang="en-US" sz="900" kern="1200" dirty="0" err="1"/>
+            <a:rPr lang="en-US" sz="800" kern="1200" dirty="0" err="1"/>
             <a:t>Paas</a:t>
           </a:r>
-          <a:endParaRPr lang="en-US" sz="900" kern="1200" dirty="0"/>
+          <a:endParaRPr lang="en-US" sz="800" kern="1200" dirty="0"/>
         </a:p>
         <a:p>
-          <a:pPr marL="57150" lvl="1" indent="-57150" algn="l" defTabSz="311150">
+          <a:pPr marL="57150" lvl="1" indent="-57150" algn="l" defTabSz="266700">
             <a:lnSpc>
               <a:spcPct val="90000"/>
             </a:lnSpc>
@@ -2316,12 +2464,12 @@
             <a:buChar char="•"/>
           </a:pPr>
           <a:r>
-            <a:rPr lang="en-US" sz="700" kern="1200" dirty="0"/>
+            <a:rPr lang="en-US" sz="600" kern="1200" dirty="0"/>
             <a:t>MSSQL DB</a:t>
           </a:r>
         </a:p>
         <a:p>
-          <a:pPr marL="57150" lvl="1" indent="-57150" algn="l" defTabSz="311150">
+          <a:pPr marL="57150" lvl="1" indent="-57150" algn="l" defTabSz="266700">
             <a:lnSpc>
               <a:spcPct val="90000"/>
             </a:lnSpc>
@@ -2334,12 +2482,12 @@
             <a:buChar char="•"/>
           </a:pPr>
           <a:r>
-            <a:rPr lang="en-US" sz="700" kern="1200" dirty="0"/>
+            <a:rPr lang="en-US" sz="600" kern="1200" dirty="0"/>
             <a:t>MSSQL AS</a:t>
           </a:r>
         </a:p>
         <a:p>
-          <a:pPr marL="57150" lvl="1" indent="-57150" algn="l" defTabSz="311150">
+          <a:pPr marL="57150" lvl="1" indent="-57150" algn="l" defTabSz="266700">
             <a:lnSpc>
               <a:spcPct val="90000"/>
             </a:lnSpc>
@@ -2352,18 +2500,18 @@
             <a:buChar char="•"/>
           </a:pPr>
           <a:r>
-            <a:rPr lang="en-US" sz="700" kern="1200" dirty="0" err="1"/>
+            <a:rPr lang="en-US" sz="600" kern="1200" dirty="0" err="1"/>
             <a:t>etc</a:t>
           </a:r>
           <a:r>
-            <a:rPr lang="en-US" sz="700" kern="1200" dirty="0"/>
+            <a:rPr lang="en-US" sz="600" kern="1200" dirty="0"/>
             <a:t>…</a:t>
           </a:r>
         </a:p>
       </dsp:txBody>
       <dsp:txXfrm>
-        <a:off x="1370979" y="2128770"/>
-        <a:ext cx="740138" cy="740138"/>
+        <a:off x="1196361" y="2146173"/>
+        <a:ext cx="644164" cy="644164"/>
       </dsp:txXfrm>
     </dsp:sp>
     <dsp:sp modelId="{DF0BE8DE-4ACD-4B7F-8F75-8D0EAF33EAA7}">
@@ -2373,8 +2521,8 @@
       </dsp:nvSpPr>
       <dsp:spPr>
         <a:xfrm>
-          <a:off x="2157597" y="1932668"/>
-          <a:ext cx="151437" cy="188910"/>
+          <a:off x="1880978" y="1975500"/>
+          <a:ext cx="131800" cy="164414"/>
         </a:xfrm>
         <a:prstGeom prst="rightArrow">
           <a:avLst>
@@ -2416,7 +2564,7 @@
         </a:bodyPr>
         <a:lstStyle/>
         <a:p>
-          <a:pPr marL="0" lvl="0" indent="0" algn="ctr" defTabSz="311150">
+          <a:pPr marL="0" lvl="0" indent="0" algn="ctr" defTabSz="266700">
             <a:lnSpc>
               <a:spcPct val="90000"/>
             </a:lnSpc>
@@ -2428,12 +2576,12 @@
             </a:spcAft>
             <a:buNone/>
           </a:pPr>
-          <a:endParaRPr lang="en-US" sz="700" kern="1200"/>
+          <a:endParaRPr lang="en-US" sz="600" kern="1200"/>
         </a:p>
       </dsp:txBody>
       <dsp:txXfrm>
-        <a:off x="2157597" y="1970450"/>
-        <a:ext cx="106006" cy="113346"/>
+        <a:off x="1880978" y="2008383"/>
+        <a:ext cx="92260" cy="98648"/>
       </dsp:txXfrm>
     </dsp:sp>
     <dsp:sp modelId="{63FAF388-BCC7-4659-830F-F530F99DB4FB}">
@@ -2443,8 +2591,8 @@
       </dsp:nvSpPr>
       <dsp:spPr>
         <a:xfrm>
-          <a:off x="2438839" y="1634027"/>
-          <a:ext cx="786192" cy="786192"/>
+          <a:off x="2125751" y="1715584"/>
+          <a:ext cx="684246" cy="684246"/>
         </a:xfrm>
         <a:prstGeom prst="roundRect">
           <a:avLst>
@@ -2500,8 +2648,8 @@
       </dsp:nvSpPr>
       <dsp:spPr>
         <a:xfrm>
-          <a:off x="2566824" y="2105743"/>
-          <a:ext cx="786192" cy="786192"/>
+          <a:off x="2237140" y="2126132"/>
+          <a:ext cx="684246" cy="684246"/>
         </a:xfrm>
         <a:prstGeom prst="roundRect">
           <a:avLst>
@@ -2544,12 +2692,12 @@
         </a:fontRef>
       </dsp:style>
       <dsp:txBody>
-        <a:bodyPr spcFirstLastPara="0" vert="horz" wrap="square" lIns="34290" tIns="34290" rIns="34290" bIns="34290" numCol="1" spcCol="1270" anchor="t" anchorCtr="0">
+        <a:bodyPr spcFirstLastPara="0" vert="horz" wrap="square" lIns="30480" tIns="30480" rIns="30480" bIns="30480" numCol="1" spcCol="1270" anchor="t" anchorCtr="0">
           <a:noAutofit/>
         </a:bodyPr>
         <a:lstStyle/>
         <a:p>
-          <a:pPr marL="0" lvl="0" indent="0" algn="l" defTabSz="400050">
+          <a:pPr marL="0" lvl="0" indent="0" algn="l" defTabSz="355600">
             <a:lnSpc>
               <a:spcPct val="90000"/>
             </a:lnSpc>
@@ -2562,13 +2710,13 @@
             <a:buNone/>
           </a:pPr>
           <a:r>
-            <a:rPr lang="en-US" sz="900" kern="1200" dirty="0" err="1"/>
+            <a:rPr lang="en-US" sz="800" kern="1200" dirty="0" err="1"/>
             <a:t>Analyse</a:t>
           </a:r>
-          <a:endParaRPr lang="en-US" sz="900" kern="1200" dirty="0"/>
+          <a:endParaRPr lang="en-US" sz="800" kern="1200" dirty="0"/>
         </a:p>
         <a:p>
-          <a:pPr marL="57150" lvl="1" indent="-57150" algn="l" defTabSz="311150">
+          <a:pPr marL="57150" lvl="1" indent="-57150" algn="l" defTabSz="266700">
             <a:lnSpc>
               <a:spcPct val="90000"/>
             </a:lnSpc>
@@ -2581,12 +2729,12 @@
             <a:buChar char="•"/>
           </a:pPr>
           <a:r>
-            <a:rPr lang="en-US" sz="700" kern="1200" dirty="0"/>
-            <a:t>Configuration</a:t>
+            <a:rPr lang="en-US" sz="600" kern="1200" dirty="0"/>
+            <a:t>Configuration (Features)</a:t>
           </a:r>
         </a:p>
         <a:p>
-          <a:pPr marL="57150" lvl="1" indent="-57150" algn="l" defTabSz="311150">
+          <a:pPr marL="57150" lvl="1" indent="-57150" algn="l" defTabSz="266700">
             <a:lnSpc>
               <a:spcPct val="90000"/>
             </a:lnSpc>
@@ -2599,14 +2747,14 @@
             <a:buChar char="•"/>
           </a:pPr>
           <a:r>
-            <a:rPr lang="en-US" sz="700" kern="1200" dirty="0"/>
+            <a:rPr lang="en-US" sz="600" kern="1200" dirty="0"/>
             <a:t>Capacity</a:t>
           </a:r>
         </a:p>
       </dsp:txBody>
       <dsp:txXfrm>
-        <a:off x="2589851" y="2128770"/>
-        <a:ext cx="740138" cy="740138"/>
+        <a:off x="2257181" y="2146173"/>
+        <a:ext cx="644164" cy="644164"/>
       </dsp:txXfrm>
     </dsp:sp>
     <dsp:sp modelId="{8941FD1B-4CC5-4B55-8CA7-66B40572A22F}">
@@ -2616,8 +2764,8 @@
       </dsp:nvSpPr>
       <dsp:spPr>
         <a:xfrm>
-          <a:off x="3376469" y="1932668"/>
-          <a:ext cx="151437" cy="188910"/>
+          <a:off x="2941799" y="1975500"/>
+          <a:ext cx="131800" cy="164414"/>
         </a:xfrm>
         <a:prstGeom prst="rightArrow">
           <a:avLst>
@@ -2659,7 +2807,7 @@
         </a:bodyPr>
         <a:lstStyle/>
         <a:p>
-          <a:pPr marL="0" lvl="0" indent="0" algn="ctr" defTabSz="311150">
+          <a:pPr marL="0" lvl="0" indent="0" algn="ctr" defTabSz="266700">
             <a:lnSpc>
               <a:spcPct val="90000"/>
             </a:lnSpc>
@@ -2671,12 +2819,12 @@
             </a:spcAft>
             <a:buNone/>
           </a:pPr>
-          <a:endParaRPr lang="en-US" sz="700" kern="1200"/>
+          <a:endParaRPr lang="en-US" sz="600" kern="1200"/>
         </a:p>
       </dsp:txBody>
       <dsp:txXfrm>
-        <a:off x="3376469" y="1970450"/>
-        <a:ext cx="106006" cy="113346"/>
+        <a:off x="2941799" y="2008383"/>
+        <a:ext cx="92260" cy="98648"/>
       </dsp:txXfrm>
     </dsp:sp>
     <dsp:sp modelId="{4144B52C-CC49-46A2-A8D9-F85B7C5CF275}">
@@ -2686,8 +2834,8 @@
       </dsp:nvSpPr>
       <dsp:spPr>
         <a:xfrm>
-          <a:off x="3657711" y="1634027"/>
-          <a:ext cx="786192" cy="786192"/>
+          <a:off x="3186572" y="1715584"/>
+          <a:ext cx="684246" cy="684246"/>
         </a:xfrm>
         <a:prstGeom prst="roundRect">
           <a:avLst>
@@ -2736,8 +2884,8 @@
       </dsp:nvSpPr>
       <dsp:spPr>
         <a:xfrm>
-          <a:off x="3785696" y="2105743"/>
-          <a:ext cx="786192" cy="786192"/>
+          <a:off x="3297961" y="2126132"/>
+          <a:ext cx="684246" cy="684246"/>
         </a:xfrm>
         <a:prstGeom prst="roundRect">
           <a:avLst>
@@ -2780,12 +2928,12 @@
         </a:fontRef>
       </dsp:style>
       <dsp:txBody>
-        <a:bodyPr spcFirstLastPara="0" vert="horz" wrap="square" lIns="34290" tIns="34290" rIns="34290" bIns="34290" numCol="1" spcCol="1270" anchor="ctr" anchorCtr="0">
+        <a:bodyPr spcFirstLastPara="0" vert="horz" wrap="square" lIns="30480" tIns="30480" rIns="30480" bIns="30480" numCol="1" spcCol="1270" anchor="ctr" anchorCtr="0">
           <a:noAutofit/>
         </a:bodyPr>
         <a:lstStyle/>
         <a:p>
-          <a:pPr marL="0" lvl="0" indent="0" algn="ctr" defTabSz="400050">
+          <a:pPr marL="0" lvl="0" indent="0" algn="ctr" defTabSz="355600">
             <a:lnSpc>
               <a:spcPct val="90000"/>
             </a:lnSpc>
@@ -2798,14 +2946,14 @@
             <a:buNone/>
           </a:pPr>
           <a:r>
-            <a:rPr lang="en-US" sz="900" kern="1200" dirty="0"/>
+            <a:rPr lang="en-US" sz="800" kern="1200" dirty="0"/>
             <a:t>Recovery</a:t>
           </a:r>
         </a:p>
       </dsp:txBody>
       <dsp:txXfrm>
-        <a:off x="3808723" y="2128770"/>
-        <a:ext cx="740138" cy="740138"/>
+        <a:off x="3318002" y="2146173"/>
+        <a:ext cx="644164" cy="644164"/>
       </dsp:txXfrm>
     </dsp:sp>
     <dsp:sp modelId="{B00397B1-61FD-4348-AAE0-9BCCC71B097A}">
@@ -2815,8 +2963,8 @@
       </dsp:nvSpPr>
       <dsp:spPr>
         <a:xfrm>
-          <a:off x="4595341" y="1932668"/>
-          <a:ext cx="151437" cy="188910"/>
+          <a:off x="4002619" y="1975500"/>
+          <a:ext cx="131800" cy="164414"/>
         </a:xfrm>
         <a:prstGeom prst="rightArrow">
           <a:avLst>
@@ -2858,7 +3006,7 @@
         </a:bodyPr>
         <a:lstStyle/>
         <a:p>
-          <a:pPr marL="0" lvl="0" indent="0" algn="ctr" defTabSz="311150">
+          <a:pPr marL="0" lvl="0" indent="0" algn="ctr" defTabSz="266700">
             <a:lnSpc>
               <a:spcPct val="90000"/>
             </a:lnSpc>
@@ -2870,12 +3018,12 @@
             </a:spcAft>
             <a:buNone/>
           </a:pPr>
-          <a:endParaRPr lang="en-US" sz="700" kern="1200"/>
+          <a:endParaRPr lang="en-US" sz="600" kern="1200"/>
         </a:p>
       </dsp:txBody>
       <dsp:txXfrm>
-        <a:off x="4595341" y="1970450"/>
-        <a:ext cx="106006" cy="113346"/>
+        <a:off x="4002619" y="2008383"/>
+        <a:ext cx="92260" cy="98648"/>
       </dsp:txXfrm>
     </dsp:sp>
     <dsp:sp modelId="{9E90FAA2-7F73-47A6-9ECD-6B83C75E0D8D}">
@@ -2885,8 +3033,8 @@
       </dsp:nvSpPr>
       <dsp:spPr>
         <a:xfrm>
-          <a:off x="4876583" y="1634027"/>
-          <a:ext cx="786192" cy="786192"/>
+          <a:off x="4247392" y="1715584"/>
+          <a:ext cx="684246" cy="684246"/>
         </a:xfrm>
         <a:prstGeom prst="roundRect">
           <a:avLst>
@@ -2935,8 +3083,8 @@
       </dsp:nvSpPr>
       <dsp:spPr>
         <a:xfrm>
-          <a:off x="5004568" y="2105743"/>
-          <a:ext cx="786192" cy="786192"/>
+          <a:off x="4358781" y="2126132"/>
+          <a:ext cx="684246" cy="684246"/>
         </a:xfrm>
         <a:prstGeom prst="roundRect">
           <a:avLst>
@@ -2979,12 +3127,12 @@
         </a:fontRef>
       </dsp:style>
       <dsp:txBody>
-        <a:bodyPr spcFirstLastPara="0" vert="horz" wrap="square" lIns="34290" tIns="34290" rIns="34290" bIns="34290" numCol="1" spcCol="1270" anchor="t" anchorCtr="0">
+        <a:bodyPr spcFirstLastPara="0" vert="horz" wrap="square" lIns="30480" tIns="30480" rIns="30480" bIns="30480" numCol="1" spcCol="1270" anchor="t" anchorCtr="0">
           <a:noAutofit/>
         </a:bodyPr>
         <a:lstStyle/>
         <a:p>
-          <a:pPr marL="0" lvl="0" indent="0" algn="l" defTabSz="400050">
+          <a:pPr marL="0" lvl="0" indent="0" algn="l" defTabSz="355600">
             <a:lnSpc>
               <a:spcPct val="90000"/>
             </a:lnSpc>
@@ -2997,12 +3145,12 @@
             <a:buNone/>
           </a:pPr>
           <a:r>
-            <a:rPr lang="en-US" sz="900" kern="1200" dirty="0"/>
+            <a:rPr lang="en-US" sz="800" kern="1200" dirty="0"/>
             <a:t>Test</a:t>
           </a:r>
         </a:p>
         <a:p>
-          <a:pPr marL="57150" lvl="1" indent="-57150" algn="l" defTabSz="311150">
+          <a:pPr marL="57150" lvl="1" indent="-57150" algn="l" defTabSz="266700">
             <a:lnSpc>
               <a:spcPct val="90000"/>
             </a:lnSpc>
@@ -3015,14 +3163,14 @@
             <a:buChar char="•"/>
           </a:pPr>
           <a:r>
-            <a:rPr lang="en-US" sz="700" kern="1200" dirty="0"/>
+            <a:rPr lang="en-US" sz="600" kern="1200" dirty="0"/>
             <a:t>System</a:t>
           </a:r>
         </a:p>
       </dsp:txBody>
       <dsp:txXfrm>
-        <a:off x="5027595" y="2128770"/>
-        <a:ext cx="740138" cy="740138"/>
+        <a:off x="4378822" y="2146173"/>
+        <a:ext cx="644164" cy="644164"/>
       </dsp:txXfrm>
     </dsp:sp>
     <dsp:sp modelId="{41FC4363-C730-4E78-A8DB-01F5BC2CA415}">
@@ -3032,8 +3180,8 @@
       </dsp:nvSpPr>
       <dsp:spPr>
         <a:xfrm>
-          <a:off x="5814213" y="1932668"/>
-          <a:ext cx="151437" cy="188910"/>
+          <a:off x="5063439" y="1975500"/>
+          <a:ext cx="131800" cy="164414"/>
         </a:xfrm>
         <a:prstGeom prst="rightArrow">
           <a:avLst>
@@ -3075,7 +3223,7 @@
         </a:bodyPr>
         <a:lstStyle/>
         <a:p>
-          <a:pPr marL="0" lvl="0" indent="0" algn="ctr" defTabSz="311150">
+          <a:pPr marL="0" lvl="0" indent="0" algn="ctr" defTabSz="266700">
             <a:lnSpc>
               <a:spcPct val="90000"/>
             </a:lnSpc>
@@ -3087,12 +3235,12 @@
             </a:spcAft>
             <a:buNone/>
           </a:pPr>
-          <a:endParaRPr lang="en-US" sz="700" kern="1200"/>
+          <a:endParaRPr lang="en-US" sz="600" kern="1200"/>
         </a:p>
       </dsp:txBody>
       <dsp:txXfrm>
-        <a:off x="5814213" y="1970450"/>
-        <a:ext cx="106006" cy="113346"/>
+        <a:off x="5063439" y="2008383"/>
+        <a:ext cx="92260" cy="98648"/>
       </dsp:txXfrm>
     </dsp:sp>
     <dsp:sp modelId="{65A28B11-E8F9-4108-9737-E10393245391}">
@@ -3102,8 +3250,8 @@
       </dsp:nvSpPr>
       <dsp:spPr>
         <a:xfrm>
-          <a:off x="6095455" y="1634027"/>
-          <a:ext cx="786192" cy="786192"/>
+          <a:off x="5308212" y="1715584"/>
+          <a:ext cx="684246" cy="684246"/>
         </a:xfrm>
         <a:prstGeom prst="roundRect">
           <a:avLst>
@@ -3152,8 +3300,8 @@
       </dsp:nvSpPr>
       <dsp:spPr>
         <a:xfrm>
-          <a:off x="6223440" y="2105743"/>
-          <a:ext cx="786192" cy="786192"/>
+          <a:off x="5419601" y="2126132"/>
+          <a:ext cx="684246" cy="684246"/>
         </a:xfrm>
         <a:prstGeom prst="roundRect">
           <a:avLst>
@@ -3196,12 +3344,12 @@
         </a:fontRef>
       </dsp:style>
       <dsp:txBody>
-        <a:bodyPr spcFirstLastPara="0" vert="horz" wrap="square" lIns="34290" tIns="34290" rIns="34290" bIns="34290" numCol="1" spcCol="1270" anchor="t" anchorCtr="0">
+        <a:bodyPr spcFirstLastPara="0" vert="horz" wrap="square" lIns="30480" tIns="30480" rIns="30480" bIns="30480" numCol="1" spcCol="1270" anchor="t" anchorCtr="0">
           <a:noAutofit/>
         </a:bodyPr>
         <a:lstStyle/>
         <a:p>
-          <a:pPr marL="0" lvl="0" indent="0" algn="l" defTabSz="400050">
+          <a:pPr marL="0" lvl="0" indent="0" algn="l" defTabSz="355600">
             <a:lnSpc>
               <a:spcPct val="90000"/>
             </a:lnSpc>
@@ -3214,12 +3362,12 @@
             <a:buNone/>
           </a:pPr>
           <a:r>
-            <a:rPr lang="en-US" sz="900" kern="1200" dirty="0"/>
+            <a:rPr lang="en-US" sz="800" kern="1200" dirty="0"/>
             <a:t>Test</a:t>
           </a:r>
         </a:p>
         <a:p>
-          <a:pPr marL="57150" lvl="1" indent="-57150" algn="l" defTabSz="311150">
+          <a:pPr marL="57150" lvl="1" indent="-57150" algn="l" defTabSz="266700">
             <a:lnSpc>
               <a:spcPct val="90000"/>
             </a:lnSpc>
@@ -3232,14 +3380,14 @@
             <a:buChar char="•"/>
           </a:pPr>
           <a:r>
-            <a:rPr lang="en-US" sz="700" kern="1200" dirty="0"/>
+            <a:rPr lang="en-US" sz="600" kern="1200" dirty="0"/>
             <a:t>Customer</a:t>
           </a:r>
         </a:p>
       </dsp:txBody>
       <dsp:txXfrm>
-        <a:off x="6246467" y="2128770"/>
-        <a:ext cx="740138" cy="740138"/>
+        <a:off x="5439642" y="2146173"/>
+        <a:ext cx="644164" cy="644164"/>
       </dsp:txXfrm>
     </dsp:sp>
     <dsp:sp modelId="{6496C8A7-1AAA-4520-9452-570B6004501A}">
@@ -3249,8 +3397,8 @@
       </dsp:nvSpPr>
       <dsp:spPr>
         <a:xfrm>
-          <a:off x="7033085" y="1932668"/>
-          <a:ext cx="151437" cy="188910"/>
+          <a:off x="6124260" y="1975500"/>
+          <a:ext cx="131800" cy="164414"/>
         </a:xfrm>
         <a:prstGeom prst="rightArrow">
           <a:avLst>
@@ -3292,7 +3440,7 @@
         </a:bodyPr>
         <a:lstStyle/>
         <a:p>
-          <a:pPr marL="0" lvl="0" indent="0" algn="ctr" defTabSz="311150">
+          <a:pPr marL="0" lvl="0" indent="0" algn="ctr" defTabSz="266700">
             <a:lnSpc>
               <a:spcPct val="90000"/>
             </a:lnSpc>
@@ -3304,12 +3452,12 @@
             </a:spcAft>
             <a:buNone/>
           </a:pPr>
-          <a:endParaRPr lang="en-US" sz="700" kern="1200"/>
+          <a:endParaRPr lang="en-US" sz="600" kern="1200"/>
         </a:p>
       </dsp:txBody>
       <dsp:txXfrm>
-        <a:off x="7033085" y="1970450"/>
-        <a:ext cx="106006" cy="113346"/>
+        <a:off x="6124260" y="2008383"/>
+        <a:ext cx="92260" cy="98648"/>
       </dsp:txXfrm>
     </dsp:sp>
     <dsp:sp modelId="{678EB37A-483E-4CAF-8A44-DB356EA82EAF}">
@@ -3319,8 +3467,8 @@
       </dsp:nvSpPr>
       <dsp:spPr>
         <a:xfrm>
-          <a:off x="7314327" y="1634027"/>
-          <a:ext cx="786192" cy="786192"/>
+          <a:off x="6369033" y="1715584"/>
+          <a:ext cx="684246" cy="684246"/>
         </a:xfrm>
         <a:prstGeom prst="roundRect">
           <a:avLst>
@@ -3369,8 +3517,8 @@
       </dsp:nvSpPr>
       <dsp:spPr>
         <a:xfrm>
-          <a:off x="7442311" y="2105743"/>
-          <a:ext cx="786192" cy="786192"/>
+          <a:off x="6480422" y="2126132"/>
+          <a:ext cx="684246" cy="684246"/>
         </a:xfrm>
         <a:prstGeom prst="roundRect">
           <a:avLst>
@@ -3413,12 +3561,12 @@
         </a:fontRef>
       </dsp:style>
       <dsp:txBody>
-        <a:bodyPr spcFirstLastPara="0" vert="horz" wrap="square" lIns="34290" tIns="34290" rIns="34290" bIns="34290" numCol="1" spcCol="1270" anchor="t" anchorCtr="0">
+        <a:bodyPr spcFirstLastPara="0" vert="horz" wrap="square" lIns="30480" tIns="30480" rIns="30480" bIns="30480" numCol="1" spcCol="1270" anchor="t" anchorCtr="0">
           <a:noAutofit/>
         </a:bodyPr>
         <a:lstStyle/>
         <a:p>
-          <a:pPr marL="0" lvl="0" indent="0" algn="l" defTabSz="400050">
+          <a:pPr marL="0" lvl="0" indent="0" algn="l" defTabSz="355600">
             <a:lnSpc>
               <a:spcPct val="90000"/>
             </a:lnSpc>
@@ -3431,12 +3579,12 @@
             <a:buNone/>
           </a:pPr>
           <a:r>
-            <a:rPr lang="en-US" sz="900" kern="1200" dirty="0"/>
+            <a:rPr lang="en-US" sz="800" kern="1200" dirty="0"/>
             <a:t>Report</a:t>
           </a:r>
         </a:p>
         <a:p>
-          <a:pPr marL="57150" lvl="1" indent="-57150" algn="l" defTabSz="311150">
+          <a:pPr marL="57150" lvl="1" indent="-57150" algn="l" defTabSz="266700">
             <a:lnSpc>
               <a:spcPct val="90000"/>
             </a:lnSpc>
@@ -3449,12 +3597,12 @@
             <a:buChar char="•"/>
           </a:pPr>
           <a:r>
-            <a:rPr lang="en-US" sz="700" kern="1200" dirty="0"/>
+            <a:rPr lang="en-US" sz="600" kern="1200" dirty="0"/>
             <a:t>History</a:t>
           </a:r>
         </a:p>
         <a:p>
-          <a:pPr marL="57150" lvl="1" indent="-57150" algn="l" defTabSz="311150">
+          <a:pPr marL="57150" lvl="1" indent="-57150" algn="l" defTabSz="266700">
             <a:lnSpc>
               <a:spcPct val="90000"/>
             </a:lnSpc>
@@ -3467,14 +3615,249 @@
             <a:buChar char="•"/>
           </a:pPr>
           <a:r>
-            <a:rPr lang="en-US" sz="700" kern="1200" dirty="0"/>
+            <a:rPr lang="en-US" sz="600" kern="1200" dirty="0"/>
             <a:t>Status</a:t>
           </a:r>
         </a:p>
       </dsp:txBody>
       <dsp:txXfrm>
-        <a:off x="7465338" y="2128770"/>
-        <a:ext cx="740138" cy="740138"/>
+        <a:off x="6500463" y="2146173"/>
+        <a:ext cx="644164" cy="644164"/>
+      </dsp:txXfrm>
+    </dsp:sp>
+    <dsp:sp modelId="{C58AB711-1DC7-4981-A453-C58359394264}">
+      <dsp:nvSpPr>
+        <dsp:cNvPr id="0" name=""/>
+        <dsp:cNvSpPr/>
+      </dsp:nvSpPr>
+      <dsp:spPr>
+        <a:xfrm>
+          <a:off x="7185080" y="1975500"/>
+          <a:ext cx="131800" cy="164414"/>
+        </a:xfrm>
+        <a:prstGeom prst="rightArrow">
+          <a:avLst>
+            <a:gd name="adj1" fmla="val 60000"/>
+            <a:gd name="adj2" fmla="val 50000"/>
+          </a:avLst>
+        </a:prstGeom>
+        <a:solidFill>
+          <a:schemeClr val="accent1">
+            <a:tint val="60000"/>
+            <a:hueOff val="0"/>
+            <a:satOff val="0"/>
+            <a:lumOff val="0"/>
+            <a:alphaOff val="0"/>
+          </a:schemeClr>
+        </a:solidFill>
+        <a:ln>
+          <a:noFill/>
+        </a:ln>
+        <a:effectLst/>
+      </dsp:spPr>
+      <dsp:style>
+        <a:lnRef idx="0">
+          <a:scrgbClr r="0" g="0" b="0"/>
+        </a:lnRef>
+        <a:fillRef idx="1">
+          <a:scrgbClr r="0" g="0" b="0"/>
+        </a:fillRef>
+        <a:effectRef idx="0">
+          <a:scrgbClr r="0" g="0" b="0"/>
+        </a:effectRef>
+        <a:fontRef idx="minor">
+          <a:schemeClr val="lt1"/>
+        </a:fontRef>
+      </dsp:style>
+      <dsp:txBody>
+        <a:bodyPr spcFirstLastPara="0" vert="horz" wrap="square" lIns="0" tIns="0" rIns="0" bIns="0" numCol="1" spcCol="1270" anchor="ctr" anchorCtr="0">
+          <a:noAutofit/>
+        </a:bodyPr>
+        <a:lstStyle/>
+        <a:p>
+          <a:pPr marL="0" lvl="0" indent="0" algn="ctr" defTabSz="266700">
+            <a:lnSpc>
+              <a:spcPct val="90000"/>
+            </a:lnSpc>
+            <a:spcBef>
+              <a:spcPct val="0"/>
+            </a:spcBef>
+            <a:spcAft>
+              <a:spcPct val="35000"/>
+            </a:spcAft>
+            <a:buNone/>
+          </a:pPr>
+          <a:endParaRPr lang="en-US" sz="600" kern="1200"/>
+        </a:p>
+      </dsp:txBody>
+      <dsp:txXfrm>
+        <a:off x="7185080" y="2008383"/>
+        <a:ext cx="92260" cy="98648"/>
+      </dsp:txXfrm>
+    </dsp:sp>
+    <dsp:sp modelId="{FB8456C6-DA59-4B6F-9149-905C8B0A5903}">
+      <dsp:nvSpPr>
+        <dsp:cNvPr id="0" name=""/>
+        <dsp:cNvSpPr/>
+      </dsp:nvSpPr>
+      <dsp:spPr>
+        <a:xfrm>
+          <a:off x="7429853" y="1715584"/>
+          <a:ext cx="684246" cy="684246"/>
+        </a:xfrm>
+        <a:prstGeom prst="roundRect">
+          <a:avLst>
+            <a:gd name="adj" fmla="val 10000"/>
+          </a:avLst>
+        </a:prstGeom>
+        <a:solidFill>
+          <a:schemeClr val="accent1">
+            <a:tint val="50000"/>
+            <a:hueOff val="0"/>
+            <a:satOff val="0"/>
+            <a:lumOff val="0"/>
+            <a:alphaOff val="0"/>
+          </a:schemeClr>
+        </a:solidFill>
+        <a:ln w="25400" cap="flat" cmpd="sng" algn="ctr">
+          <a:solidFill>
+            <a:schemeClr val="lt1">
+              <a:hueOff val="0"/>
+              <a:satOff val="0"/>
+              <a:lumOff val="0"/>
+              <a:alphaOff val="0"/>
+            </a:schemeClr>
+          </a:solidFill>
+          <a:prstDash val="solid"/>
+        </a:ln>
+        <a:effectLst/>
+      </dsp:spPr>
+      <dsp:style>
+        <a:lnRef idx="2">
+          <a:scrgbClr r="0" g="0" b="0"/>
+        </a:lnRef>
+        <a:fillRef idx="1">
+          <a:scrgbClr r="0" g="0" b="0"/>
+        </a:fillRef>
+        <a:effectRef idx="0">
+          <a:scrgbClr r="0" g="0" b="0"/>
+        </a:effectRef>
+        <a:fontRef idx="minor"/>
+      </dsp:style>
+    </dsp:sp>
+    <dsp:sp modelId="{F6934BC3-D1C6-4B65-8251-F4877F052B8F}">
+      <dsp:nvSpPr>
+        <dsp:cNvPr id="0" name=""/>
+        <dsp:cNvSpPr/>
+      </dsp:nvSpPr>
+      <dsp:spPr>
+        <a:xfrm>
+          <a:off x="7541242" y="2126132"/>
+          <a:ext cx="684246" cy="684246"/>
+        </a:xfrm>
+        <a:prstGeom prst="roundRect">
+          <a:avLst>
+            <a:gd name="adj" fmla="val 10000"/>
+          </a:avLst>
+        </a:prstGeom>
+        <a:solidFill>
+          <a:schemeClr val="accent1">
+            <a:hueOff val="0"/>
+            <a:satOff val="0"/>
+            <a:lumOff val="0"/>
+            <a:alphaOff val="0"/>
+          </a:schemeClr>
+        </a:solidFill>
+        <a:ln w="25400" cap="flat" cmpd="sng" algn="ctr">
+          <a:solidFill>
+            <a:schemeClr val="lt1">
+              <a:hueOff val="0"/>
+              <a:satOff val="0"/>
+              <a:lumOff val="0"/>
+              <a:alphaOff val="0"/>
+            </a:schemeClr>
+          </a:solidFill>
+          <a:prstDash val="solid"/>
+        </a:ln>
+        <a:effectLst/>
+      </dsp:spPr>
+      <dsp:style>
+        <a:lnRef idx="2">
+          <a:scrgbClr r="0" g="0" b="0"/>
+        </a:lnRef>
+        <a:fillRef idx="1">
+          <a:scrgbClr r="0" g="0" b="0"/>
+        </a:fillRef>
+        <a:effectRef idx="0">
+          <a:scrgbClr r="0" g="0" b="0"/>
+        </a:effectRef>
+        <a:fontRef idx="minor">
+          <a:schemeClr val="lt1"/>
+        </a:fontRef>
+      </dsp:style>
+      <dsp:txBody>
+        <a:bodyPr spcFirstLastPara="0" vert="horz" wrap="square" lIns="30480" tIns="30480" rIns="30480" bIns="30480" numCol="1" spcCol="1270" anchor="t" anchorCtr="0">
+          <a:noAutofit/>
+        </a:bodyPr>
+        <a:lstStyle/>
+        <a:p>
+          <a:pPr marL="0" lvl="0" indent="0" algn="l" defTabSz="355600">
+            <a:lnSpc>
+              <a:spcPct val="90000"/>
+            </a:lnSpc>
+            <a:spcBef>
+              <a:spcPct val="0"/>
+            </a:spcBef>
+            <a:spcAft>
+              <a:spcPct val="35000"/>
+            </a:spcAft>
+            <a:buNone/>
+          </a:pPr>
+          <a:r>
+            <a:rPr lang="en-US" sz="800" kern="1200" dirty="0"/>
+            <a:t>Cleanup</a:t>
+          </a:r>
+        </a:p>
+        <a:p>
+          <a:pPr marL="57150" lvl="1" indent="-57150" algn="l" defTabSz="266700">
+            <a:lnSpc>
+              <a:spcPct val="90000"/>
+            </a:lnSpc>
+            <a:spcBef>
+              <a:spcPct val="0"/>
+            </a:spcBef>
+            <a:spcAft>
+              <a:spcPct val="15000"/>
+            </a:spcAft>
+            <a:buChar char="•"/>
+          </a:pPr>
+          <a:r>
+            <a:rPr lang="en-US" sz="600" kern="1200" dirty="0"/>
+            <a:t>Database</a:t>
+          </a:r>
+        </a:p>
+        <a:p>
+          <a:pPr marL="57150" lvl="1" indent="-57150" algn="l" defTabSz="266700">
+            <a:lnSpc>
+              <a:spcPct val="90000"/>
+            </a:lnSpc>
+            <a:spcBef>
+              <a:spcPct val="0"/>
+            </a:spcBef>
+            <a:spcAft>
+              <a:spcPct val="15000"/>
+            </a:spcAft>
+            <a:buChar char="•"/>
+          </a:pPr>
+          <a:r>
+            <a:rPr lang="en-US" sz="600" kern="1200" dirty="0"/>
+            <a:t>Backup set</a:t>
+          </a:r>
+        </a:p>
+      </dsp:txBody>
+      <dsp:txXfrm>
+        <a:off x="7561283" y="2146173"/>
+        <a:ext cx="644164" cy="644164"/>
       </dsp:txXfrm>
     </dsp:sp>
   </dsp:spTree>
@@ -4755,6 +5138,545 @@
 </dgm:styleDef>
 </file>
 
+<file path=ppt/notesMasters/notesMaster1.xml><?xml version="1.0" encoding="utf-8"?>
+<p:notesMaster xmlns:a="http://schemas.openxmlformats.org/drawingml/2006/main" xmlns:r="http://schemas.openxmlformats.org/officeDocument/2006/relationships" xmlns:p="http://schemas.openxmlformats.org/presentationml/2006/main">
+  <p:cSld>
+    <p:bg>
+      <p:bgRef idx="1001">
+        <a:schemeClr val="bg1"/>
+      </p:bgRef>
+    </p:bg>
+    <p:spTree>
+      <p:nvGrpSpPr>
+        <p:cNvPr id="1" name=""/>
+        <p:cNvGrpSpPr/>
+        <p:nvPr/>
+      </p:nvGrpSpPr>
+      <p:grpSpPr>
+        <a:xfrm>
+          <a:off x="0" y="0"/>
+          <a:ext cx="0" cy="0"/>
+          <a:chOff x="0" y="0"/>
+          <a:chExt cx="0" cy="0"/>
+        </a:xfrm>
+      </p:grpSpPr>
+      <p:sp>
+        <p:nvSpPr>
+          <p:cNvPr id="2" name="Pladsholder til sidehoved 1"/>
+          <p:cNvSpPr>
+            <a:spLocks noGrp="1"/>
+          </p:cNvSpPr>
+          <p:nvPr>
+            <p:ph type="hdr" sz="quarter"/>
+          </p:nvPr>
+        </p:nvSpPr>
+        <p:spPr>
+          <a:xfrm>
+            <a:off x="0" y="0"/>
+            <a:ext cx="2971800" cy="458788"/>
+          </a:xfrm>
+          <a:prstGeom prst="rect">
+            <a:avLst/>
+          </a:prstGeom>
+        </p:spPr>
+        <p:txBody>
+          <a:bodyPr vert="horz" lIns="91440" tIns="45720" rIns="91440" bIns="45720" rtlCol="0"/>
+          <a:lstStyle>
+            <a:lvl1pPr algn="l">
+              <a:defRPr sz="1200"/>
+            </a:lvl1pPr>
+          </a:lstStyle>
+          <a:p>
+            <a:endParaRPr lang="da-DK"/>
+          </a:p>
+        </p:txBody>
+      </p:sp>
+      <p:sp>
+        <p:nvSpPr>
+          <p:cNvPr id="3" name="Pladsholder til dato 2"/>
+          <p:cNvSpPr>
+            <a:spLocks noGrp="1"/>
+          </p:cNvSpPr>
+          <p:nvPr>
+            <p:ph type="dt" idx="1"/>
+          </p:nvPr>
+        </p:nvSpPr>
+        <p:spPr>
+          <a:xfrm>
+            <a:off x="3884613" y="0"/>
+            <a:ext cx="2971800" cy="458788"/>
+          </a:xfrm>
+          <a:prstGeom prst="rect">
+            <a:avLst/>
+          </a:prstGeom>
+        </p:spPr>
+        <p:txBody>
+          <a:bodyPr vert="horz" lIns="91440" tIns="45720" rIns="91440" bIns="45720" rtlCol="0"/>
+          <a:lstStyle>
+            <a:lvl1pPr algn="r">
+              <a:defRPr sz="1200"/>
+            </a:lvl1pPr>
+          </a:lstStyle>
+          <a:p>
+            <a:fld id="{3478607F-DE2C-4FAA-A9C0-BF42B3D5BD02}" type="datetimeFigureOut">
+              <a:rPr lang="da-DK" smtClean="0"/>
+              <a:t>14-08-2017</a:t>
+            </a:fld>
+            <a:endParaRPr lang="da-DK"/>
+          </a:p>
+        </p:txBody>
+      </p:sp>
+      <p:sp>
+        <p:nvSpPr>
+          <p:cNvPr id="4" name="Pladsholder til slidebillede 3"/>
+          <p:cNvSpPr>
+            <a:spLocks noGrp="1" noRot="1" noChangeAspect="1"/>
+          </p:cNvSpPr>
+          <p:nvPr>
+            <p:ph type="sldImg" idx="2"/>
+          </p:nvPr>
+        </p:nvSpPr>
+        <p:spPr>
+          <a:xfrm>
+            <a:off x="1371600" y="1143000"/>
+            <a:ext cx="4114800" cy="3086100"/>
+          </a:xfrm>
+          <a:prstGeom prst="rect">
+            <a:avLst/>
+          </a:prstGeom>
+          <a:noFill/>
+          <a:ln w="12700">
+            <a:solidFill>
+              <a:prstClr val="black"/>
+            </a:solidFill>
+          </a:ln>
+        </p:spPr>
+        <p:txBody>
+          <a:bodyPr vert="horz" lIns="91440" tIns="45720" rIns="91440" bIns="45720" rtlCol="0" anchor="ctr"/>
+          <a:lstStyle/>
+          <a:p>
+            <a:endParaRPr lang="da-DK"/>
+          </a:p>
+        </p:txBody>
+      </p:sp>
+      <p:sp>
+        <p:nvSpPr>
+          <p:cNvPr id="5" name="Pladsholder til noter 4"/>
+          <p:cNvSpPr>
+            <a:spLocks noGrp="1"/>
+          </p:cNvSpPr>
+          <p:nvPr>
+            <p:ph type="body" sz="quarter" idx="3"/>
+          </p:nvPr>
+        </p:nvSpPr>
+        <p:spPr>
+          <a:xfrm>
+            <a:off x="685800" y="4400550"/>
+            <a:ext cx="5486400" cy="3600450"/>
+          </a:xfrm>
+          <a:prstGeom prst="rect">
+            <a:avLst/>
+          </a:prstGeom>
+        </p:spPr>
+        <p:txBody>
+          <a:bodyPr vert="horz" lIns="91440" tIns="45720" rIns="91440" bIns="45720" rtlCol="0"/>
+          <a:lstStyle/>
+          <a:p>
+            <a:pPr lvl="0"/>
+            <a:r>
+              <a:rPr lang="da-DK"/>
+              <a:t>Rediger typografien i masterens</a:t>
+            </a:r>
+          </a:p>
+          <a:p>
+            <a:pPr lvl="1"/>
+            <a:r>
+              <a:rPr lang="da-DK"/>
+              <a:t>Andet niveau</a:t>
+            </a:r>
+          </a:p>
+          <a:p>
+            <a:pPr lvl="2"/>
+            <a:r>
+              <a:rPr lang="da-DK"/>
+              <a:t>Tredje niveau</a:t>
+            </a:r>
+          </a:p>
+          <a:p>
+            <a:pPr lvl="3"/>
+            <a:r>
+              <a:rPr lang="da-DK"/>
+              <a:t>Fjerde niveau</a:t>
+            </a:r>
+          </a:p>
+          <a:p>
+            <a:pPr lvl="4"/>
+            <a:r>
+              <a:rPr lang="da-DK"/>
+              <a:t>Femte niveau</a:t>
+            </a:r>
+          </a:p>
+        </p:txBody>
+      </p:sp>
+      <p:sp>
+        <p:nvSpPr>
+          <p:cNvPr id="6" name="Pladsholder til sidefod 5"/>
+          <p:cNvSpPr>
+            <a:spLocks noGrp="1"/>
+          </p:cNvSpPr>
+          <p:nvPr>
+            <p:ph type="ftr" sz="quarter" idx="4"/>
+          </p:nvPr>
+        </p:nvSpPr>
+        <p:spPr>
+          <a:xfrm>
+            <a:off x="0" y="8685213"/>
+            <a:ext cx="2971800" cy="458787"/>
+          </a:xfrm>
+          <a:prstGeom prst="rect">
+            <a:avLst/>
+          </a:prstGeom>
+        </p:spPr>
+        <p:txBody>
+          <a:bodyPr vert="horz" lIns="91440" tIns="45720" rIns="91440" bIns="45720" rtlCol="0" anchor="b"/>
+          <a:lstStyle>
+            <a:lvl1pPr algn="l">
+              <a:defRPr sz="1200"/>
+            </a:lvl1pPr>
+          </a:lstStyle>
+          <a:p>
+            <a:endParaRPr lang="da-DK"/>
+          </a:p>
+        </p:txBody>
+      </p:sp>
+      <p:sp>
+        <p:nvSpPr>
+          <p:cNvPr id="7" name="Pladsholder til slidenummer 6"/>
+          <p:cNvSpPr>
+            <a:spLocks noGrp="1"/>
+          </p:cNvSpPr>
+          <p:nvPr>
+            <p:ph type="sldNum" sz="quarter" idx="5"/>
+          </p:nvPr>
+        </p:nvSpPr>
+        <p:spPr>
+          <a:xfrm>
+            <a:off x="3884613" y="8685213"/>
+            <a:ext cx="2971800" cy="458787"/>
+          </a:xfrm>
+          <a:prstGeom prst="rect">
+            <a:avLst/>
+          </a:prstGeom>
+        </p:spPr>
+        <p:txBody>
+          <a:bodyPr vert="horz" lIns="91440" tIns="45720" rIns="91440" bIns="45720" rtlCol="0" anchor="b"/>
+          <a:lstStyle>
+            <a:lvl1pPr algn="r">
+              <a:defRPr sz="1200"/>
+            </a:lvl1pPr>
+          </a:lstStyle>
+          <a:p>
+            <a:fld id="{98D83480-A6BC-4F00-9732-1C51E2014B72}" type="slidenum">
+              <a:rPr lang="da-DK" smtClean="0"/>
+              <a:t>‹nr.›</a:t>
+            </a:fld>
+            <a:endParaRPr lang="da-DK"/>
+          </a:p>
+        </p:txBody>
+      </p:sp>
+    </p:spTree>
+    <p:extLst>
+      <p:ext uri="{BB962C8B-B14F-4D97-AF65-F5344CB8AC3E}">
+        <p14:creationId xmlns:p14="http://schemas.microsoft.com/office/powerpoint/2010/main" val="1160768102"/>
+      </p:ext>
+    </p:extLst>
+  </p:cSld>
+  <p:clrMap bg1="lt1" tx1="dk1" bg2="lt2" tx2="dk2" accent1="accent1" accent2="accent2" accent3="accent3" accent4="accent4" accent5="accent5" accent6="accent6" hlink="hlink" folHlink="folHlink"/>
+  <p:notesStyle>
+    <a:lvl1pPr marL="0" algn="l" defTabSz="914400" rtl="0" eaLnBrk="1" latinLnBrk="0" hangingPunct="1">
+      <a:defRPr sz="1200" kern="1200">
+        <a:solidFill>
+          <a:schemeClr val="tx1"/>
+        </a:solidFill>
+        <a:latin typeface="+mn-lt"/>
+        <a:ea typeface="+mn-ea"/>
+        <a:cs typeface="+mn-cs"/>
+      </a:defRPr>
+    </a:lvl1pPr>
+    <a:lvl2pPr marL="457200" algn="l" defTabSz="914400" rtl="0" eaLnBrk="1" latinLnBrk="0" hangingPunct="1">
+      <a:defRPr sz="1200" kern="1200">
+        <a:solidFill>
+          <a:schemeClr val="tx1"/>
+        </a:solidFill>
+        <a:latin typeface="+mn-lt"/>
+        <a:ea typeface="+mn-ea"/>
+        <a:cs typeface="+mn-cs"/>
+      </a:defRPr>
+    </a:lvl2pPr>
+    <a:lvl3pPr marL="914400" algn="l" defTabSz="914400" rtl="0" eaLnBrk="1" latinLnBrk="0" hangingPunct="1">
+      <a:defRPr sz="1200" kern="1200">
+        <a:solidFill>
+          <a:schemeClr val="tx1"/>
+        </a:solidFill>
+        <a:latin typeface="+mn-lt"/>
+        <a:ea typeface="+mn-ea"/>
+        <a:cs typeface="+mn-cs"/>
+      </a:defRPr>
+    </a:lvl3pPr>
+    <a:lvl4pPr marL="1371600" algn="l" defTabSz="914400" rtl="0" eaLnBrk="1" latinLnBrk="0" hangingPunct="1">
+      <a:defRPr sz="1200" kern="1200">
+        <a:solidFill>
+          <a:schemeClr val="tx1"/>
+        </a:solidFill>
+        <a:latin typeface="+mn-lt"/>
+        <a:ea typeface="+mn-ea"/>
+        <a:cs typeface="+mn-cs"/>
+      </a:defRPr>
+    </a:lvl4pPr>
+    <a:lvl5pPr marL="1828800" algn="l" defTabSz="914400" rtl="0" eaLnBrk="1" latinLnBrk="0" hangingPunct="1">
+      <a:defRPr sz="1200" kern="1200">
+        <a:solidFill>
+          <a:schemeClr val="tx1"/>
+        </a:solidFill>
+        <a:latin typeface="+mn-lt"/>
+        <a:ea typeface="+mn-ea"/>
+        <a:cs typeface="+mn-cs"/>
+      </a:defRPr>
+    </a:lvl5pPr>
+    <a:lvl6pPr marL="2286000" algn="l" defTabSz="914400" rtl="0" eaLnBrk="1" latinLnBrk="0" hangingPunct="1">
+      <a:defRPr sz="1200" kern="1200">
+        <a:solidFill>
+          <a:schemeClr val="tx1"/>
+        </a:solidFill>
+        <a:latin typeface="+mn-lt"/>
+        <a:ea typeface="+mn-ea"/>
+        <a:cs typeface="+mn-cs"/>
+      </a:defRPr>
+    </a:lvl6pPr>
+    <a:lvl7pPr marL="2743200" algn="l" defTabSz="914400" rtl="0" eaLnBrk="1" latinLnBrk="0" hangingPunct="1">
+      <a:defRPr sz="1200" kern="1200">
+        <a:solidFill>
+          <a:schemeClr val="tx1"/>
+        </a:solidFill>
+        <a:latin typeface="+mn-lt"/>
+        <a:ea typeface="+mn-ea"/>
+        <a:cs typeface="+mn-cs"/>
+      </a:defRPr>
+    </a:lvl7pPr>
+    <a:lvl8pPr marL="3200400" algn="l" defTabSz="914400" rtl="0" eaLnBrk="1" latinLnBrk="0" hangingPunct="1">
+      <a:defRPr sz="1200" kern="1200">
+        <a:solidFill>
+          <a:schemeClr val="tx1"/>
+        </a:solidFill>
+        <a:latin typeface="+mn-lt"/>
+        <a:ea typeface="+mn-ea"/>
+        <a:cs typeface="+mn-cs"/>
+      </a:defRPr>
+    </a:lvl8pPr>
+    <a:lvl9pPr marL="3657600" algn="l" defTabSz="914400" rtl="0" eaLnBrk="1" latinLnBrk="0" hangingPunct="1">
+      <a:defRPr sz="1200" kern="1200">
+        <a:solidFill>
+          <a:schemeClr val="tx1"/>
+        </a:solidFill>
+        <a:latin typeface="+mn-lt"/>
+        <a:ea typeface="+mn-ea"/>
+        <a:cs typeface="+mn-cs"/>
+      </a:defRPr>
+    </a:lvl9pPr>
+  </p:notesStyle>
+</p:notesMaster>
+</file>
+
+<file path=ppt/notesSlides/notesSlide1.xml><?xml version="1.0" encoding="utf-8"?>
+<p:notes xmlns:a="http://schemas.openxmlformats.org/drawingml/2006/main" xmlns:r="http://schemas.openxmlformats.org/officeDocument/2006/relationships" xmlns:p="http://schemas.openxmlformats.org/presentationml/2006/main">
+  <p:cSld>
+    <p:spTree>
+      <p:nvGrpSpPr>
+        <p:cNvPr id="1" name=""/>
+        <p:cNvGrpSpPr/>
+        <p:nvPr/>
+      </p:nvGrpSpPr>
+      <p:grpSpPr>
+        <a:xfrm>
+          <a:off x="0" y="0"/>
+          <a:ext cx="0" cy="0"/>
+          <a:chOff x="0" y="0"/>
+          <a:chExt cx="0" cy="0"/>
+        </a:xfrm>
+      </p:grpSpPr>
+      <p:sp>
+        <p:nvSpPr>
+          <p:cNvPr id="2" name="Pladsholder til slidebillede 1"/>
+          <p:cNvSpPr>
+            <a:spLocks noGrp="1" noRot="1" noChangeAspect="1"/>
+          </p:cNvSpPr>
+          <p:nvPr>
+            <p:ph type="sldImg"/>
+          </p:nvPr>
+        </p:nvSpPr>
+        <p:spPr/>
+      </p:sp>
+      <p:sp>
+        <p:nvSpPr>
+          <p:cNvPr id="3" name="Pladsholder til noter 2"/>
+          <p:cNvSpPr>
+            <a:spLocks noGrp="1"/>
+          </p:cNvSpPr>
+          <p:nvPr>
+            <p:ph type="body" idx="1"/>
+          </p:nvPr>
+        </p:nvSpPr>
+        <p:spPr/>
+        <p:txBody>
+          <a:bodyPr/>
+          <a:lstStyle/>
+          <a:p>
+            <a:r>
+              <a:rPr lang="da-DK" dirty="0"/>
+              <a:t>Ref.: IT </a:t>
+            </a:r>
+            <a:r>
+              <a:rPr lang="da-DK" dirty="0" err="1"/>
+              <a:t>Infrastructure</a:t>
+            </a:r>
+            <a:r>
+              <a:rPr lang="da-DK" dirty="0"/>
+              <a:t>, p 104</a:t>
+            </a:r>
+          </a:p>
+        </p:txBody>
+      </p:sp>
+      <p:sp>
+        <p:nvSpPr>
+          <p:cNvPr id="4" name="Pladsholder til slidenummer 3"/>
+          <p:cNvSpPr>
+            <a:spLocks noGrp="1"/>
+          </p:cNvSpPr>
+          <p:nvPr>
+            <p:ph type="sldNum" sz="quarter" idx="10"/>
+          </p:nvPr>
+        </p:nvSpPr>
+        <p:spPr/>
+        <p:txBody>
+          <a:bodyPr/>
+          <a:lstStyle/>
+          <a:p>
+            <a:fld id="{98D83480-A6BC-4F00-9732-1C51E2014B72}" type="slidenum">
+              <a:rPr lang="da-DK" smtClean="0"/>
+              <a:t>7</a:t>
+            </a:fld>
+            <a:endParaRPr lang="da-DK"/>
+          </a:p>
+        </p:txBody>
+      </p:sp>
+    </p:spTree>
+    <p:extLst>
+      <p:ext uri="{BB962C8B-B14F-4D97-AF65-F5344CB8AC3E}">
+        <p14:creationId xmlns:p14="http://schemas.microsoft.com/office/powerpoint/2010/main" val="3260762763"/>
+      </p:ext>
+    </p:extLst>
+  </p:cSld>
+  <p:clrMapOvr>
+    <a:masterClrMapping/>
+  </p:clrMapOvr>
+</p:notes>
+</file>
+
+<file path=ppt/notesSlides/notesSlide2.xml><?xml version="1.0" encoding="utf-8"?>
+<p:notes xmlns:a="http://schemas.openxmlformats.org/drawingml/2006/main" xmlns:r="http://schemas.openxmlformats.org/officeDocument/2006/relationships" xmlns:p="http://schemas.openxmlformats.org/presentationml/2006/main">
+  <p:cSld>
+    <p:spTree>
+      <p:nvGrpSpPr>
+        <p:cNvPr id="1" name=""/>
+        <p:cNvGrpSpPr/>
+        <p:nvPr/>
+      </p:nvGrpSpPr>
+      <p:grpSpPr>
+        <a:xfrm>
+          <a:off x="0" y="0"/>
+          <a:ext cx="0" cy="0"/>
+          <a:chOff x="0" y="0"/>
+          <a:chExt cx="0" cy="0"/>
+        </a:xfrm>
+      </p:grpSpPr>
+      <p:sp>
+        <p:nvSpPr>
+          <p:cNvPr id="2" name="Pladsholder til slidebillede 1"/>
+          <p:cNvSpPr>
+            <a:spLocks noGrp="1" noRot="1" noChangeAspect="1"/>
+          </p:cNvSpPr>
+          <p:nvPr>
+            <p:ph type="sldImg"/>
+          </p:nvPr>
+        </p:nvSpPr>
+        <p:spPr/>
+      </p:sp>
+      <p:sp>
+        <p:nvSpPr>
+          <p:cNvPr id="3" name="Pladsholder til noter 2"/>
+          <p:cNvSpPr>
+            <a:spLocks noGrp="1"/>
+          </p:cNvSpPr>
+          <p:nvPr>
+            <p:ph type="body" idx="1"/>
+          </p:nvPr>
+        </p:nvSpPr>
+        <p:spPr/>
+        <p:txBody>
+          <a:bodyPr/>
+          <a:lstStyle/>
+          <a:p>
+            <a:r>
+              <a:rPr lang="da-DK" dirty="0"/>
+              <a:t>Ref.: IT </a:t>
+            </a:r>
+            <a:r>
+              <a:rPr lang="da-DK" dirty="0" err="1"/>
+              <a:t>Infrastructure</a:t>
+            </a:r>
+            <a:r>
+              <a:rPr lang="da-DK" dirty="0"/>
+              <a:t>, p 106</a:t>
+            </a:r>
+          </a:p>
+        </p:txBody>
+      </p:sp>
+      <p:sp>
+        <p:nvSpPr>
+          <p:cNvPr id="4" name="Pladsholder til slidenummer 3"/>
+          <p:cNvSpPr>
+            <a:spLocks noGrp="1"/>
+          </p:cNvSpPr>
+          <p:nvPr>
+            <p:ph type="sldNum" sz="quarter" idx="10"/>
+          </p:nvPr>
+        </p:nvSpPr>
+        <p:spPr/>
+        <p:txBody>
+          <a:bodyPr/>
+          <a:lstStyle/>
+          <a:p>
+            <a:fld id="{98D83480-A6BC-4F00-9732-1C51E2014B72}" type="slidenum">
+              <a:rPr lang="da-DK" smtClean="0"/>
+              <a:t>8</a:t>
+            </a:fld>
+            <a:endParaRPr lang="da-DK"/>
+          </a:p>
+        </p:txBody>
+      </p:sp>
+    </p:spTree>
+    <p:extLst>
+      <p:ext uri="{BB962C8B-B14F-4D97-AF65-F5344CB8AC3E}">
+        <p14:creationId xmlns:p14="http://schemas.microsoft.com/office/powerpoint/2010/main" val="2976948852"/>
+      </p:ext>
+    </p:extLst>
+  </p:cSld>
+  <p:clrMapOvr>
+    <a:masterClrMapping/>
+  </p:clrMapOvr>
+</p:notes>
+</file>
+
 <file path=ppt/slideLayouts/slideLayout1.xml><?xml version="1.0" encoding="utf-8"?>
 <p:sldLayout xmlns:a="http://schemas.openxmlformats.org/drawingml/2006/main" xmlns:r="http://schemas.openxmlformats.org/officeDocument/2006/relationships" xmlns:p="http://schemas.openxmlformats.org/presentationml/2006/main" type="title" preserve="1">
   <p:cSld name="Title Slide">
@@ -4935,7 +5857,7 @@
             <a:fld id="{1D8BD707-D9CF-40AE-B4C6-C98DA3205C09}" type="datetimeFigureOut">
               <a:rPr lang="en-US" smtClean="0"/>
               <a:pPr/>
-              <a:t>8/2/2017</a:t>
+              <a:t>8/14/2017</a:t>
             </a:fld>
             <a:endParaRPr lang="en-US"/>
           </a:p>
@@ -4978,7 +5900,7 @@
             <a:fld id="{B6F15528-21DE-4FAA-801E-634DDDAF4B2B}" type="slidenum">
               <a:rPr lang="en-US" smtClean="0"/>
               <a:pPr/>
-              <a:t>‹#›</a:t>
+              <a:t>‹nr.›</a:t>
             </a:fld>
             <a:endParaRPr lang="en-US"/>
           </a:p>
@@ -5100,7 +6022,7 @@
             <a:fld id="{1D8BD707-D9CF-40AE-B4C6-C98DA3205C09}" type="datetimeFigureOut">
               <a:rPr lang="en-US" smtClean="0"/>
               <a:pPr/>
-              <a:t>8/2/2017</a:t>
+              <a:t>8/14/2017</a:t>
             </a:fld>
             <a:endParaRPr lang="en-US"/>
           </a:p>
@@ -5143,7 +6065,7 @@
             <a:fld id="{B6F15528-21DE-4FAA-801E-634DDDAF4B2B}" type="slidenum">
               <a:rPr lang="en-US" smtClean="0"/>
               <a:pPr/>
-              <a:t>‹#›</a:t>
+              <a:t>‹nr.›</a:t>
             </a:fld>
             <a:endParaRPr lang="en-US"/>
           </a:p>
@@ -5275,7 +6197,7 @@
             <a:fld id="{1D8BD707-D9CF-40AE-B4C6-C98DA3205C09}" type="datetimeFigureOut">
               <a:rPr lang="en-US" smtClean="0"/>
               <a:pPr/>
-              <a:t>8/2/2017</a:t>
+              <a:t>8/14/2017</a:t>
             </a:fld>
             <a:endParaRPr lang="en-US"/>
           </a:p>
@@ -5318,7 +6240,7 @@
             <a:fld id="{B6F15528-21DE-4FAA-801E-634DDDAF4B2B}" type="slidenum">
               <a:rPr lang="en-US" smtClean="0"/>
               <a:pPr/>
-              <a:t>‹#›</a:t>
+              <a:t>‹nr.›</a:t>
             </a:fld>
             <a:endParaRPr lang="en-US"/>
           </a:p>
@@ -5440,7 +6362,7 @@
             <a:fld id="{1D8BD707-D9CF-40AE-B4C6-C98DA3205C09}" type="datetimeFigureOut">
               <a:rPr lang="en-US" smtClean="0"/>
               <a:pPr/>
-              <a:t>8/2/2017</a:t>
+              <a:t>8/14/2017</a:t>
             </a:fld>
             <a:endParaRPr lang="en-US"/>
           </a:p>
@@ -5483,7 +6405,7 @@
             <a:fld id="{B6F15528-21DE-4FAA-801E-634DDDAF4B2B}" type="slidenum">
               <a:rPr lang="en-US" smtClean="0"/>
               <a:pPr/>
-              <a:t>‹#›</a:t>
+              <a:t>‹nr.›</a:t>
             </a:fld>
             <a:endParaRPr lang="en-US"/>
           </a:p>
@@ -5682,7 +6604,7 @@
             <a:fld id="{1D8BD707-D9CF-40AE-B4C6-C98DA3205C09}" type="datetimeFigureOut">
               <a:rPr lang="en-US" smtClean="0"/>
               <a:pPr/>
-              <a:t>8/2/2017</a:t>
+              <a:t>8/14/2017</a:t>
             </a:fld>
             <a:endParaRPr lang="en-US"/>
           </a:p>
@@ -5725,7 +6647,7 @@
             <a:fld id="{B6F15528-21DE-4FAA-801E-634DDDAF4B2B}" type="slidenum">
               <a:rPr lang="en-US" smtClean="0"/>
               <a:pPr/>
-              <a:t>‹#›</a:t>
+              <a:t>‹nr.›</a:t>
             </a:fld>
             <a:endParaRPr lang="en-US"/>
           </a:p>
@@ -5964,7 +6886,7 @@
             <a:fld id="{1D8BD707-D9CF-40AE-B4C6-C98DA3205C09}" type="datetimeFigureOut">
               <a:rPr lang="en-US" smtClean="0"/>
               <a:pPr/>
-              <a:t>8/2/2017</a:t>
+              <a:t>8/14/2017</a:t>
             </a:fld>
             <a:endParaRPr lang="en-US"/>
           </a:p>
@@ -6007,7 +6929,7 @@
             <a:fld id="{B6F15528-21DE-4FAA-801E-634DDDAF4B2B}" type="slidenum">
               <a:rPr lang="en-US" smtClean="0"/>
               <a:pPr/>
-              <a:t>‹#›</a:t>
+              <a:t>‹nr.›</a:t>
             </a:fld>
             <a:endParaRPr lang="en-US"/>
           </a:p>
@@ -6380,7 +7302,7 @@
             <a:fld id="{1D8BD707-D9CF-40AE-B4C6-C98DA3205C09}" type="datetimeFigureOut">
               <a:rPr lang="en-US" smtClean="0"/>
               <a:pPr/>
-              <a:t>8/2/2017</a:t>
+              <a:t>8/14/2017</a:t>
             </a:fld>
             <a:endParaRPr lang="en-US"/>
           </a:p>
@@ -6423,7 +7345,7 @@
             <a:fld id="{B6F15528-21DE-4FAA-801E-634DDDAF4B2B}" type="slidenum">
               <a:rPr lang="en-US" smtClean="0"/>
               <a:pPr/>
-              <a:t>‹#›</a:t>
+              <a:t>‹nr.›</a:t>
             </a:fld>
             <a:endParaRPr lang="en-US"/>
           </a:p>
@@ -6494,7 +7416,7 @@
             <a:fld id="{1D8BD707-D9CF-40AE-B4C6-C98DA3205C09}" type="datetimeFigureOut">
               <a:rPr lang="en-US" smtClean="0"/>
               <a:pPr/>
-              <a:t>8/2/2017</a:t>
+              <a:t>8/14/2017</a:t>
             </a:fld>
             <a:endParaRPr lang="en-US"/>
           </a:p>
@@ -6537,7 +7459,7 @@
             <a:fld id="{B6F15528-21DE-4FAA-801E-634DDDAF4B2B}" type="slidenum">
               <a:rPr lang="en-US" smtClean="0"/>
               <a:pPr/>
-              <a:t>‹#›</a:t>
+              <a:t>‹nr.›</a:t>
             </a:fld>
             <a:endParaRPr lang="en-US"/>
           </a:p>
@@ -6586,7 +7508,7 @@
             <a:fld id="{1D8BD707-D9CF-40AE-B4C6-C98DA3205C09}" type="datetimeFigureOut">
               <a:rPr lang="en-US" smtClean="0"/>
               <a:pPr/>
-              <a:t>8/2/2017</a:t>
+              <a:t>8/14/2017</a:t>
             </a:fld>
             <a:endParaRPr lang="en-US"/>
           </a:p>
@@ -6629,7 +7551,7 @@
             <a:fld id="{B6F15528-21DE-4FAA-801E-634DDDAF4B2B}" type="slidenum">
               <a:rPr lang="en-US" smtClean="0"/>
               <a:pPr/>
-              <a:t>‹#›</a:t>
+              <a:t>‹nr.›</a:t>
             </a:fld>
             <a:endParaRPr lang="en-US"/>
           </a:p>
@@ -6858,7 +7780,7 @@
             <a:fld id="{1D8BD707-D9CF-40AE-B4C6-C98DA3205C09}" type="datetimeFigureOut">
               <a:rPr lang="en-US" smtClean="0"/>
               <a:pPr/>
-              <a:t>8/2/2017</a:t>
+              <a:t>8/14/2017</a:t>
             </a:fld>
             <a:endParaRPr lang="en-US"/>
           </a:p>
@@ -6901,7 +7823,7 @@
             <a:fld id="{B6F15528-21DE-4FAA-801E-634DDDAF4B2B}" type="slidenum">
               <a:rPr lang="en-US" smtClean="0"/>
               <a:pPr/>
-              <a:t>‹#›</a:t>
+              <a:t>‹nr.›</a:t>
             </a:fld>
             <a:endParaRPr lang="en-US"/>
           </a:p>
@@ -7107,7 +8029,7 @@
             <a:fld id="{1D8BD707-D9CF-40AE-B4C6-C98DA3205C09}" type="datetimeFigureOut">
               <a:rPr lang="en-US" smtClean="0"/>
               <a:pPr/>
-              <a:t>8/2/2017</a:t>
+              <a:t>8/14/2017</a:t>
             </a:fld>
             <a:endParaRPr lang="en-US"/>
           </a:p>
@@ -7150,7 +8072,7 @@
             <a:fld id="{B6F15528-21DE-4FAA-801E-634DDDAF4B2B}" type="slidenum">
               <a:rPr lang="en-US" smtClean="0"/>
               <a:pPr/>
-              <a:t>‹#›</a:t>
+              <a:t>‹nr.›</a:t>
             </a:fld>
             <a:endParaRPr lang="en-US"/>
           </a:p>
@@ -7315,7 +8237,7 @@
             <a:fld id="{1D8BD707-D9CF-40AE-B4C6-C98DA3205C09}" type="datetimeFigureOut">
               <a:rPr lang="en-US" smtClean="0"/>
               <a:pPr/>
-              <a:t>8/2/2017</a:t>
+              <a:t>8/14/2017</a:t>
             </a:fld>
             <a:endParaRPr lang="en-US"/>
           </a:p>
@@ -7394,7 +8316,7 @@
             <a:fld id="{B6F15528-21DE-4FAA-801E-634DDDAF4B2B}" type="slidenum">
               <a:rPr lang="en-US" smtClean="0"/>
               <a:pPr/>
-              <a:t>‹#›</a:t>
+              <a:t>‹nr.›</a:t>
             </a:fld>
             <a:endParaRPr lang="en-US"/>
           </a:p>
@@ -7921,7 +8843,7 @@
             <p:ph idx="1"/>
             <p:extLst>
               <p:ext uri="{D42A27DB-BD31-4B8C-83A1-F6EECF244321}">
-                <p14:modId xmlns:p14="http://schemas.microsoft.com/office/powerpoint/2010/main" val="776713360"/>
+                <p14:modId xmlns:p14="http://schemas.microsoft.com/office/powerpoint/2010/main" val="3752126811"/>
               </p:ext>
             </p:extLst>
           </p:nvPr>
@@ -8018,9 +8940,9 @@
           <p:nvPr/>
         </p:nvGrpSpPr>
         <p:grpSpPr>
-          <a:xfrm>
-            <a:off x="990600" y="5029200"/>
-            <a:ext cx="151437" cy="188910"/>
+          <a:xfrm rot="13237825">
+            <a:off x="1262393" y="5088377"/>
+            <a:ext cx="1369714" cy="205419"/>
             <a:chOff x="938725" y="1932668"/>
             <a:chExt cx="151437" cy="188910"/>
           </a:xfrm>
@@ -8153,8 +9075,8 @@
           <p:nvPr/>
         </p:nvGrpSpPr>
         <p:grpSpPr>
-          <a:xfrm rot="14630857">
-            <a:off x="2086699" y="4942660"/>
+          <a:xfrm rot="13644078">
+            <a:off x="2205305" y="4863583"/>
             <a:ext cx="724984" cy="188910"/>
             <a:chOff x="938725" y="1932668"/>
             <a:chExt cx="151437" cy="188910"/>
@@ -8558,9 +9480,9 @@
           <p:nvPr/>
         </p:nvGrpSpPr>
         <p:grpSpPr>
-          <a:xfrm>
-            <a:off x="5753100" y="4934745"/>
-            <a:ext cx="151437" cy="188910"/>
+          <a:xfrm rot="16939038">
+            <a:off x="5417311" y="4808736"/>
+            <a:ext cx="498163" cy="188910"/>
             <a:chOff x="938725" y="1932668"/>
             <a:chExt cx="151437" cy="188910"/>
           </a:xfrm>
@@ -8693,9 +9615,9 @@
           <p:nvPr/>
         </p:nvGrpSpPr>
         <p:grpSpPr>
-          <a:xfrm>
-            <a:off x="7020470" y="4962857"/>
-            <a:ext cx="151437" cy="188910"/>
+          <a:xfrm rot="18503074">
+            <a:off x="5902694" y="5021127"/>
+            <a:ext cx="1280965" cy="188910"/>
             <a:chOff x="938725" y="1932668"/>
             <a:chExt cx="151437" cy="188910"/>
           </a:xfrm>
@@ -8828,9 +9750,9 @@
           <p:nvPr/>
         </p:nvGrpSpPr>
         <p:grpSpPr>
-          <a:xfrm>
-            <a:off x="8166690" y="4962857"/>
-            <a:ext cx="151437" cy="188910"/>
+          <a:xfrm rot="19641489">
+            <a:off x="6049407" y="5138657"/>
+            <a:ext cx="2243867" cy="188910"/>
             <a:chOff x="938725" y="1932668"/>
             <a:chExt cx="151437" cy="188910"/>
           </a:xfrm>
@@ -9026,7 +9948,9 @@
         </p:nvSpPr>
         <p:spPr/>
         <p:txBody>
-          <a:bodyPr/>
+          <a:bodyPr>
+            <a:normAutofit fontScale="92500" lnSpcReduction="10000"/>
+          </a:bodyPr>
           <a:lstStyle/>
           <a:p>
             <a:r>
@@ -9068,6 +9992,22 @@
               <a:rPr lang="da-DK" dirty="0"/>
               <a:t>Customer test scripts</a:t>
             </a:r>
+          </a:p>
+          <a:p>
+            <a:pPr lvl="1"/>
+            <a:r>
+              <a:rPr lang="da-DK" dirty="0" err="1"/>
+              <a:t>Get</a:t>
+            </a:r>
+            <a:endParaRPr lang="da-DK" dirty="0"/>
+          </a:p>
+          <a:p>
+            <a:pPr lvl="1"/>
+            <a:r>
+              <a:rPr lang="da-DK" dirty="0" err="1"/>
+              <a:t>Verify</a:t>
+            </a:r>
+            <a:endParaRPr lang="da-DK" dirty="0"/>
           </a:p>
         </p:txBody>
       </p:sp>
@@ -9342,7 +10282,7 @@
             <a:pPr lvl="1"/>
             <a:r>
               <a:rPr lang="da-DK" dirty="0"/>
-              <a:t>Customer test</a:t>
+              <a:t>Customer test (script)</a:t>
             </a:r>
           </a:p>
           <a:p>
@@ -9703,15 +10643,6 @@
             </a:pPr>
             <a:endParaRPr lang="da-DK" dirty="0"/>
           </a:p>
-          <a:p>
-            <a:pPr marL="0" indent="0">
-              <a:buNone/>
-            </a:pPr>
-            <a:r>
-              <a:rPr lang="da-DK" dirty="0"/>
-              <a:t>ref.: IT Infrastructure, sec 7.2</a:t>
-            </a:r>
-          </a:p>
         </p:txBody>
       </p:sp>
     </p:spTree>
@@ -9790,7 +10721,9 @@
         </p:nvSpPr>
         <p:spPr/>
         <p:txBody>
-          <a:bodyPr/>
+          <a:bodyPr>
+            <a:normAutofit lnSpcReduction="10000"/>
+          </a:bodyPr>
           <a:lstStyle/>
           <a:p>
             <a:r>
@@ -9832,6 +10765,20 @@
             <a:r>
               <a:rPr lang="da-DK" dirty="0"/>
               <a:t>MDS</a:t>
+            </a:r>
+          </a:p>
+          <a:p>
+            <a:r>
+              <a:rPr lang="da-DK" dirty="0"/>
+              <a:t>Reporting Services; </a:t>
+            </a:r>
+            <a:r>
+              <a:rPr lang="da-DK" dirty="0" err="1"/>
+              <a:t>reports</a:t>
+            </a:r>
+            <a:r>
+              <a:rPr lang="da-DK" dirty="0"/>
+              <a:t> &amp; cache</a:t>
             </a:r>
           </a:p>
         </p:txBody>
@@ -10130,4 +11077,299 @@
   <a:objectDefaults/>
   <a:extraClrSchemeLst/>
 </a:theme>
+</file>
+
+<file path=ppt/theme/theme2.xml><?xml version="1.0" encoding="utf-8"?>
+<a:theme xmlns:a="http://schemas.openxmlformats.org/drawingml/2006/main" name="Office-tema">
+  <a:themeElements>
+    <a:clrScheme name="Kontor">
+      <a:dk1>
+        <a:sysClr val="windowText" lastClr="000000"/>
+      </a:dk1>
+      <a:lt1>
+        <a:sysClr val="window" lastClr="FFFFFF"/>
+      </a:lt1>
+      <a:dk2>
+        <a:srgbClr val="44546A"/>
+      </a:dk2>
+      <a:lt2>
+        <a:srgbClr val="E7E6E6"/>
+      </a:lt2>
+      <a:accent1>
+        <a:srgbClr val="4472C4"/>
+      </a:accent1>
+      <a:accent2>
+        <a:srgbClr val="ED7D31"/>
+      </a:accent2>
+      <a:accent3>
+        <a:srgbClr val="A5A5A5"/>
+      </a:accent3>
+      <a:accent4>
+        <a:srgbClr val="FFC000"/>
+      </a:accent4>
+      <a:accent5>
+        <a:srgbClr val="5B9BD5"/>
+      </a:accent5>
+      <a:accent6>
+        <a:srgbClr val="70AD47"/>
+      </a:accent6>
+      <a:hlink>
+        <a:srgbClr val="0563C1"/>
+      </a:hlink>
+      <a:folHlink>
+        <a:srgbClr val="954F72"/>
+      </a:folHlink>
+    </a:clrScheme>
+    <a:fontScheme name="Kontor">
+      <a:majorFont>
+        <a:latin typeface="Calibri Light" panose="020F0302020204030204"/>
+        <a:ea typeface=""/>
+        <a:cs typeface=""/>
+        <a:font script="Jpan" typeface="游ゴシック Light"/>
+        <a:font script="Hang" typeface="맑은 고딕"/>
+        <a:font script="Hans" typeface="等线 Light"/>
+        <a:font script="Hant" typeface="新細明體"/>
+        <a:font script="Arab" typeface="Times New Roman"/>
+        <a:font script="Hebr" typeface="Times New Roman"/>
+        <a:font script="Thai" typeface="Angsana New"/>
+        <a:font script="Ethi" typeface="Nyala"/>
+        <a:font script="Beng" typeface="Vrinda"/>
+        <a:font script="Gujr" typeface="Shruti"/>
+        <a:font script="Khmr" typeface="MoolBoran"/>
+        <a:font script="Knda" typeface="Tunga"/>
+        <a:font script="Guru" typeface="Raavi"/>
+        <a:font script="Cans" typeface="Euphemia"/>
+        <a:font script="Cher" typeface="Plantagenet Cherokee"/>
+        <a:font script="Yiii" typeface="Microsoft Yi Baiti"/>
+        <a:font script="Tibt" typeface="Microsoft Himalaya"/>
+        <a:font script="Thaa" typeface="MV Boli"/>
+        <a:font script="Deva" typeface="Mangal"/>
+        <a:font script="Telu" typeface="Gautami"/>
+        <a:font script="Taml" typeface="Latha"/>
+        <a:font script="Syrc" typeface="Estrangelo Edessa"/>
+        <a:font script="Orya" typeface="Kalinga"/>
+        <a:font script="Mlym" typeface="Kartika"/>
+        <a:font script="Laoo" typeface="DokChampa"/>
+        <a:font script="Sinh" typeface="Iskoola Pota"/>
+        <a:font script="Mong" typeface="Mongolian Baiti"/>
+        <a:font script="Viet" typeface="Times New Roman"/>
+        <a:font script="Uigh" typeface="Microsoft Uighur"/>
+        <a:font script="Geor" typeface="Sylfaen"/>
+        <a:font script="Armn" typeface="Arial"/>
+        <a:font script="Bugi" typeface="Leelawadee UI"/>
+        <a:font script="Bopo" typeface="Microsoft JhengHei"/>
+        <a:font script="Java" typeface="Javanese Text"/>
+        <a:font script="Lisu" typeface="Segoe UI"/>
+        <a:font script="Mymr" typeface="Myanmar Text"/>
+        <a:font script="Nkoo" typeface="Ebrima"/>
+        <a:font script="Olck" typeface="Nirmala UI"/>
+        <a:font script="Osma" typeface="Ebrima"/>
+        <a:font script="Phag" typeface="Phagspa"/>
+        <a:font script="Syrn" typeface="Estrangelo Edessa"/>
+        <a:font script="Syrj" typeface="Estrangelo Edessa"/>
+        <a:font script="Syre" typeface="Estrangelo Edessa"/>
+        <a:font script="Sora" typeface="Nirmala UI"/>
+        <a:font script="Tale" typeface="Microsoft Tai Le"/>
+        <a:font script="Talu" typeface="Microsoft New Tai Lue"/>
+        <a:font script="Tfng" typeface="Ebrima"/>
+      </a:majorFont>
+      <a:minorFont>
+        <a:latin typeface="Calibri" panose="020F0502020204030204"/>
+        <a:ea typeface=""/>
+        <a:cs typeface=""/>
+        <a:font script="Jpan" typeface="游ゴシック"/>
+        <a:font script="Hang" typeface="맑은 고딕"/>
+        <a:font script="Hans" typeface="等线"/>
+        <a:font script="Hant" typeface="新細明體"/>
+        <a:font script="Arab" typeface="Arial"/>
+        <a:font script="Hebr" typeface="Arial"/>
+        <a:font script="Thai" typeface="Cordia New"/>
+        <a:font script="Ethi" typeface="Nyala"/>
+        <a:font script="Beng" typeface="Vrinda"/>
+        <a:font script="Gujr" typeface="Shruti"/>
+        <a:font script="Khmr" typeface="DaunPenh"/>
+        <a:font script="Knda" typeface="Tunga"/>
+        <a:font script="Guru" typeface="Raavi"/>
+        <a:font script="Cans" typeface="Euphemia"/>
+        <a:font script="Cher" typeface="Plantagenet Cherokee"/>
+        <a:font script="Yiii" typeface="Microsoft Yi Baiti"/>
+        <a:font script="Tibt" typeface="Microsoft Himalaya"/>
+        <a:font script="Thaa" typeface="MV Boli"/>
+        <a:font script="Deva" typeface="Mangal"/>
+        <a:font script="Telu" typeface="Gautami"/>
+        <a:font script="Taml" typeface="Latha"/>
+        <a:font script="Syrc" typeface="Estrangelo Edessa"/>
+        <a:font script="Orya" typeface="Kalinga"/>
+        <a:font script="Mlym" typeface="Kartika"/>
+        <a:font script="Laoo" typeface="DokChampa"/>
+        <a:font script="Sinh" typeface="Iskoola Pota"/>
+        <a:font script="Mong" typeface="Mongolian Baiti"/>
+        <a:font script="Viet" typeface="Arial"/>
+        <a:font script="Uigh" typeface="Microsoft Uighur"/>
+        <a:font script="Geor" typeface="Sylfaen"/>
+        <a:font script="Armn" typeface="Arial"/>
+        <a:font script="Bugi" typeface="Leelawadee UI"/>
+        <a:font script="Bopo" typeface="Microsoft JhengHei"/>
+        <a:font script="Java" typeface="Javanese Text"/>
+        <a:font script="Lisu" typeface="Segoe UI"/>
+        <a:font script="Mymr" typeface="Myanmar Text"/>
+        <a:font script="Nkoo" typeface="Ebrima"/>
+        <a:font script="Olck" typeface="Nirmala UI"/>
+        <a:font script="Osma" typeface="Ebrima"/>
+        <a:font script="Phag" typeface="Phagspa"/>
+        <a:font script="Syrn" typeface="Estrangelo Edessa"/>
+        <a:font script="Syrj" typeface="Estrangelo Edessa"/>
+        <a:font script="Syre" typeface="Estrangelo Edessa"/>
+        <a:font script="Sora" typeface="Nirmala UI"/>
+        <a:font script="Tale" typeface="Microsoft Tai Le"/>
+        <a:font script="Talu" typeface="Microsoft New Tai Lue"/>
+        <a:font script="Tfng" typeface="Ebrima"/>
+      </a:minorFont>
+    </a:fontScheme>
+    <a:fmtScheme name="Kontor">
+      <a:fillStyleLst>
+        <a:solidFill>
+          <a:schemeClr val="phClr"/>
+        </a:solidFill>
+        <a:gradFill rotWithShape="1">
+          <a:gsLst>
+            <a:gs pos="0">
+              <a:schemeClr val="phClr">
+                <a:lumMod val="110000"/>
+                <a:satMod val="105000"/>
+                <a:tint val="67000"/>
+              </a:schemeClr>
+            </a:gs>
+            <a:gs pos="50000">
+              <a:schemeClr val="phClr">
+                <a:lumMod val="105000"/>
+                <a:satMod val="103000"/>
+                <a:tint val="73000"/>
+              </a:schemeClr>
+            </a:gs>
+            <a:gs pos="100000">
+              <a:schemeClr val="phClr">
+                <a:lumMod val="105000"/>
+                <a:satMod val="109000"/>
+                <a:tint val="81000"/>
+              </a:schemeClr>
+            </a:gs>
+          </a:gsLst>
+          <a:lin ang="5400000" scaled="0"/>
+        </a:gradFill>
+        <a:gradFill rotWithShape="1">
+          <a:gsLst>
+            <a:gs pos="0">
+              <a:schemeClr val="phClr">
+                <a:satMod val="103000"/>
+                <a:lumMod val="102000"/>
+                <a:tint val="94000"/>
+              </a:schemeClr>
+            </a:gs>
+            <a:gs pos="50000">
+              <a:schemeClr val="phClr">
+                <a:satMod val="110000"/>
+                <a:lumMod val="100000"/>
+                <a:shade val="100000"/>
+              </a:schemeClr>
+            </a:gs>
+            <a:gs pos="100000">
+              <a:schemeClr val="phClr">
+                <a:lumMod val="99000"/>
+                <a:satMod val="120000"/>
+                <a:shade val="78000"/>
+              </a:schemeClr>
+            </a:gs>
+          </a:gsLst>
+          <a:lin ang="5400000" scaled="0"/>
+        </a:gradFill>
+      </a:fillStyleLst>
+      <a:lnStyleLst>
+        <a:ln w="6350" cap="flat" cmpd="sng" algn="ctr">
+          <a:solidFill>
+            <a:schemeClr val="phClr"/>
+          </a:solidFill>
+          <a:prstDash val="solid"/>
+          <a:miter lim="800000"/>
+        </a:ln>
+        <a:ln w="12700" cap="flat" cmpd="sng" algn="ctr">
+          <a:solidFill>
+            <a:schemeClr val="phClr"/>
+          </a:solidFill>
+          <a:prstDash val="solid"/>
+          <a:miter lim="800000"/>
+        </a:ln>
+        <a:ln w="19050" cap="flat" cmpd="sng" algn="ctr">
+          <a:solidFill>
+            <a:schemeClr val="phClr"/>
+          </a:solidFill>
+          <a:prstDash val="solid"/>
+          <a:miter lim="800000"/>
+        </a:ln>
+      </a:lnStyleLst>
+      <a:effectStyleLst>
+        <a:effectStyle>
+          <a:effectLst/>
+        </a:effectStyle>
+        <a:effectStyle>
+          <a:effectLst/>
+        </a:effectStyle>
+        <a:effectStyle>
+          <a:effectLst>
+            <a:outerShdw blurRad="57150" dist="19050" dir="5400000" algn="ctr" rotWithShape="0">
+              <a:srgbClr val="000000">
+                <a:alpha val="63000"/>
+              </a:srgbClr>
+            </a:outerShdw>
+          </a:effectLst>
+        </a:effectStyle>
+      </a:effectStyleLst>
+      <a:bgFillStyleLst>
+        <a:solidFill>
+          <a:schemeClr val="phClr"/>
+        </a:solidFill>
+        <a:solidFill>
+          <a:schemeClr val="phClr">
+            <a:tint val="95000"/>
+            <a:satMod val="170000"/>
+          </a:schemeClr>
+        </a:solidFill>
+        <a:gradFill rotWithShape="1">
+          <a:gsLst>
+            <a:gs pos="0">
+              <a:schemeClr val="phClr">
+                <a:tint val="93000"/>
+                <a:satMod val="150000"/>
+                <a:shade val="98000"/>
+                <a:lumMod val="102000"/>
+              </a:schemeClr>
+            </a:gs>
+            <a:gs pos="50000">
+              <a:schemeClr val="phClr">
+                <a:tint val="98000"/>
+                <a:satMod val="130000"/>
+                <a:shade val="90000"/>
+                <a:lumMod val="103000"/>
+              </a:schemeClr>
+            </a:gs>
+            <a:gs pos="100000">
+              <a:schemeClr val="phClr">
+                <a:shade val="63000"/>
+                <a:satMod val="120000"/>
+              </a:schemeClr>
+            </a:gs>
+          </a:gsLst>
+          <a:lin ang="5400000" scaled="0"/>
+        </a:gradFill>
+      </a:bgFillStyleLst>
+    </a:fmtScheme>
+  </a:themeElements>
+  <a:objectDefaults/>
+  <a:extraClrSchemeLst/>
+  <a:extLst>
+    <a:ext uri="{05A4C25C-085E-4340-85A3-A5531E510DB2}">
+      <thm15:themeFamily xmlns:thm15="http://schemas.microsoft.com/office/thememl/2012/main" name="Office Theme" id="{62F939B6-93AF-4DB8-9C6B-D6C7DFDC589F}" vid="{4A3C46E8-61CC-4603-A589-7422A47A8E4A}"/>
+    </a:ext>
+  </a:extLst>
+</a:theme>
 </file>
</xml_diff>